<commit_message>
Add floating chatbot feature for user assistance
</commit_message>
<xml_diff>
--- a/project-assets/Blood Demand Prediction .pptx
+++ b/project-assets/Blood Demand Prediction .pptx
@@ -2,7 +2,7 @@
 <file path=ppt/presentation.xml><?xml version="1.0" encoding="utf-8"?>
 <p:presentation xmlns:a="http://schemas.openxmlformats.org/drawingml/2006/main" xmlns:r="http://schemas.openxmlformats.org/officeDocument/2006/relationships" xmlns:p="http://schemas.openxmlformats.org/presentationml/2006/main" saveSubsetFonts="1" autoCompressPictures="0">
   <p:sldMasterIdLst>
-    <p:sldMasterId id="2147483650" r:id="rId1"/>
+    <p:sldMasterId id="2147483663" r:id="rId1"/>
   </p:sldMasterIdLst>
   <p:notesMasterIdLst>
     <p:notesMasterId r:id="rId24"/>
@@ -37,7 +37,7 @@
     <a:defPPr>
       <a:defRPr lang="en-US"/>
     </a:defPPr>
-    <a:lvl1pPr marL="0" algn="l" defTabSz="457200" rtl="0" eaLnBrk="1" latinLnBrk="0" hangingPunct="1">
+    <a:lvl1pPr marL="0" algn="l" defTabSz="914400" rtl="0" eaLnBrk="1" latinLnBrk="0" hangingPunct="1">
       <a:defRPr sz="1800" kern="1200">
         <a:solidFill>
           <a:schemeClr val="tx1"/>
@@ -47,7 +47,7 @@
         <a:cs typeface="+mn-cs"/>
       </a:defRPr>
     </a:lvl1pPr>
-    <a:lvl2pPr marL="457200" algn="l" defTabSz="457200" rtl="0" eaLnBrk="1" latinLnBrk="0" hangingPunct="1">
+    <a:lvl2pPr marL="457200" algn="l" defTabSz="914400" rtl="0" eaLnBrk="1" latinLnBrk="0" hangingPunct="1">
       <a:defRPr sz="1800" kern="1200">
         <a:solidFill>
           <a:schemeClr val="tx1"/>
@@ -57,7 +57,7 @@
         <a:cs typeface="+mn-cs"/>
       </a:defRPr>
     </a:lvl2pPr>
-    <a:lvl3pPr marL="914400" algn="l" defTabSz="457200" rtl="0" eaLnBrk="1" latinLnBrk="0" hangingPunct="1">
+    <a:lvl3pPr marL="914400" algn="l" defTabSz="914400" rtl="0" eaLnBrk="1" latinLnBrk="0" hangingPunct="1">
       <a:defRPr sz="1800" kern="1200">
         <a:solidFill>
           <a:schemeClr val="tx1"/>
@@ -67,7 +67,7 @@
         <a:cs typeface="+mn-cs"/>
       </a:defRPr>
     </a:lvl3pPr>
-    <a:lvl4pPr marL="1371600" algn="l" defTabSz="457200" rtl="0" eaLnBrk="1" latinLnBrk="0" hangingPunct="1">
+    <a:lvl4pPr marL="1371600" algn="l" defTabSz="914400" rtl="0" eaLnBrk="1" latinLnBrk="0" hangingPunct="1">
       <a:defRPr sz="1800" kern="1200">
         <a:solidFill>
           <a:schemeClr val="tx1"/>
@@ -77,7 +77,7 @@
         <a:cs typeface="+mn-cs"/>
       </a:defRPr>
     </a:lvl4pPr>
-    <a:lvl5pPr marL="1828800" algn="l" defTabSz="457200" rtl="0" eaLnBrk="1" latinLnBrk="0" hangingPunct="1">
+    <a:lvl5pPr marL="1828800" algn="l" defTabSz="914400" rtl="0" eaLnBrk="1" latinLnBrk="0" hangingPunct="1">
       <a:defRPr sz="1800" kern="1200">
         <a:solidFill>
           <a:schemeClr val="tx1"/>
@@ -87,7 +87,7 @@
         <a:cs typeface="+mn-cs"/>
       </a:defRPr>
     </a:lvl5pPr>
-    <a:lvl6pPr marL="2286000" algn="l" defTabSz="457200" rtl="0" eaLnBrk="1" latinLnBrk="0" hangingPunct="1">
+    <a:lvl6pPr marL="2286000" algn="l" defTabSz="914400" rtl="0" eaLnBrk="1" latinLnBrk="0" hangingPunct="1">
       <a:defRPr sz="1800" kern="1200">
         <a:solidFill>
           <a:schemeClr val="tx1"/>
@@ -97,7 +97,7 @@
         <a:cs typeface="+mn-cs"/>
       </a:defRPr>
     </a:lvl6pPr>
-    <a:lvl7pPr marL="2743200" algn="l" defTabSz="457200" rtl="0" eaLnBrk="1" latinLnBrk="0" hangingPunct="1">
+    <a:lvl7pPr marL="2743200" algn="l" defTabSz="914400" rtl="0" eaLnBrk="1" latinLnBrk="0" hangingPunct="1">
       <a:defRPr sz="1800" kern="1200">
         <a:solidFill>
           <a:schemeClr val="tx1"/>
@@ -107,7 +107,7 @@
         <a:cs typeface="+mn-cs"/>
       </a:defRPr>
     </a:lvl7pPr>
-    <a:lvl8pPr marL="3200400" algn="l" defTabSz="457200" rtl="0" eaLnBrk="1" latinLnBrk="0" hangingPunct="1">
+    <a:lvl8pPr marL="3200400" algn="l" defTabSz="914400" rtl="0" eaLnBrk="1" latinLnBrk="0" hangingPunct="1">
       <a:defRPr sz="1800" kern="1200">
         <a:solidFill>
           <a:schemeClr val="tx1"/>
@@ -117,7 +117,7 @@
         <a:cs typeface="+mn-cs"/>
       </a:defRPr>
     </a:lvl8pPr>
-    <a:lvl9pPr marL="3657600" algn="l" defTabSz="457200" rtl="0" eaLnBrk="1" latinLnBrk="0" hangingPunct="1">
+    <a:lvl9pPr marL="3657600" algn="l" defTabSz="914400" rtl="0" eaLnBrk="1" latinLnBrk="0" hangingPunct="1">
       <a:defRPr sz="1800" kern="1200">
         <a:solidFill>
           <a:schemeClr val="tx1"/>
@@ -139,9 +139,177 @@
 <file path=ppt/revisionInfo.xml><?xml version="1.0" encoding="utf-8"?>
 <p1510:revInfo xmlns:a="http://schemas.openxmlformats.org/drawingml/2006/main" xmlns:r="http://schemas.openxmlformats.org/officeDocument/2006/relationships" xmlns:p1510="http://schemas.microsoft.com/office/powerpoint/2015/10/main">
   <p1510:revLst>
-    <p1510:client id="{8AC034B0-F630-4AB4-A2E7-DB9175A99FB4}" v="32" dt="2025-12-22T03:19:05.191"/>
+    <p1510:client id="{B10420F7-1D4C-4D62-96A9-256AB3F46120}" v="95" dt="2025-12-25T17:30:06.482"/>
   </p1510:revLst>
 </p1510:revInfo>
+</file>
+
+<file path=ppt/changesInfos/changesInfo1.xml><?xml version="1.0" encoding="utf-8"?>
+<pc:chgInfo xmlns:a="http://schemas.openxmlformats.org/drawingml/2006/main" xmlns:r="http://schemas.openxmlformats.org/officeDocument/2006/relationships" xmlns:ac="http://schemas.microsoft.com/office/drawing/2013/main/command" xmlns:pc="http://schemas.microsoft.com/office/powerpoint/2013/main/command">
+  <pc:docChgLst>
+    <pc:chgData name="Kellampalli Saathvik" userId="e958bb122ac88004" providerId="LiveId" clId="{00B80D4F-7DFB-43A3-9929-3FB4F844D800}"/>
+    <pc:docChg chg="modSld">
+      <pc:chgData name="Kellampalli Saathvik" userId="e958bb122ac88004" providerId="LiveId" clId="{00B80D4F-7DFB-43A3-9929-3FB4F844D800}" dt="2025-12-25T17:23:24.755" v="93"/>
+      <pc:docMkLst>
+        <pc:docMk/>
+      </pc:docMkLst>
+      <pc:sldChg chg="modTransition">
+        <pc:chgData name="Kellampalli Saathvik" userId="e958bb122ac88004" providerId="LiveId" clId="{00B80D4F-7DFB-43A3-9929-3FB4F844D800}" dt="2025-12-25T17:04:49.733" v="3"/>
+        <pc:sldMkLst>
+          <pc:docMk/>
+          <pc:sldMk cId="0" sldId="256"/>
+        </pc:sldMkLst>
+      </pc:sldChg>
+      <pc:sldChg chg="modTransition">
+        <pc:chgData name="Kellampalli Saathvik" userId="e958bb122ac88004" providerId="LiveId" clId="{00B80D4F-7DFB-43A3-9929-3FB4F844D800}" dt="2025-12-25T17:05:19.501" v="8"/>
+        <pc:sldMkLst>
+          <pc:docMk/>
+          <pc:sldMk cId="0" sldId="257"/>
+        </pc:sldMkLst>
+      </pc:sldChg>
+      <pc:sldChg chg="modTransition">
+        <pc:chgData name="Kellampalli Saathvik" userId="e958bb122ac88004" providerId="LiveId" clId="{00B80D4F-7DFB-43A3-9929-3FB4F844D800}" dt="2025-12-25T17:05:27.437" v="9"/>
+        <pc:sldMkLst>
+          <pc:docMk/>
+          <pc:sldMk cId="0" sldId="258"/>
+        </pc:sldMkLst>
+      </pc:sldChg>
+      <pc:sldChg chg="modTransition">
+        <pc:chgData name="Kellampalli Saathvik" userId="e958bb122ac88004" providerId="LiveId" clId="{00B80D4F-7DFB-43A3-9929-3FB4F844D800}" dt="2025-12-25T17:14:08.749" v="35"/>
+        <pc:sldMkLst>
+          <pc:docMk/>
+          <pc:sldMk cId="0" sldId="259"/>
+        </pc:sldMkLst>
+      </pc:sldChg>
+      <pc:sldChg chg="modTransition">
+        <pc:chgData name="Kellampalli Saathvik" userId="e958bb122ac88004" providerId="LiveId" clId="{00B80D4F-7DFB-43A3-9929-3FB4F844D800}" dt="2025-12-25T17:14:49.259" v="39"/>
+        <pc:sldMkLst>
+          <pc:docMk/>
+          <pc:sldMk cId="0" sldId="260"/>
+        </pc:sldMkLst>
+      </pc:sldChg>
+      <pc:sldChg chg="modTransition">
+        <pc:chgData name="Kellampalli Saathvik" userId="e958bb122ac88004" providerId="LiveId" clId="{00B80D4F-7DFB-43A3-9929-3FB4F844D800}" dt="2025-12-25T17:15:33.529" v="46"/>
+        <pc:sldMkLst>
+          <pc:docMk/>
+          <pc:sldMk cId="0" sldId="261"/>
+        </pc:sldMkLst>
+      </pc:sldChg>
+      <pc:sldChg chg="modTransition">
+        <pc:chgData name="Kellampalli Saathvik" userId="e958bb122ac88004" providerId="LiveId" clId="{00B80D4F-7DFB-43A3-9929-3FB4F844D800}" dt="2025-12-25T17:16:07.700" v="52"/>
+        <pc:sldMkLst>
+          <pc:docMk/>
+          <pc:sldMk cId="0" sldId="262"/>
+        </pc:sldMkLst>
+      </pc:sldChg>
+      <pc:sldChg chg="modTransition">
+        <pc:chgData name="Kellampalli Saathvik" userId="e958bb122ac88004" providerId="LiveId" clId="{00B80D4F-7DFB-43A3-9929-3FB4F844D800}" dt="2025-12-25T17:17:17.680" v="62"/>
+        <pc:sldMkLst>
+          <pc:docMk/>
+          <pc:sldMk cId="0" sldId="263"/>
+        </pc:sldMkLst>
+      </pc:sldChg>
+      <pc:sldChg chg="modTransition">
+        <pc:chgData name="Kellampalli Saathvik" userId="e958bb122ac88004" providerId="LiveId" clId="{00B80D4F-7DFB-43A3-9929-3FB4F844D800}" dt="2025-12-25T17:18:49.589" v="75"/>
+        <pc:sldMkLst>
+          <pc:docMk/>
+          <pc:sldMk cId="0" sldId="264"/>
+        </pc:sldMkLst>
+      </pc:sldChg>
+      <pc:sldChg chg="modTransition">
+        <pc:chgData name="Kellampalli Saathvik" userId="e958bb122ac88004" providerId="LiveId" clId="{00B80D4F-7DFB-43A3-9929-3FB4F844D800}" dt="2025-12-25T17:19:15.309" v="80"/>
+        <pc:sldMkLst>
+          <pc:docMk/>
+          <pc:sldMk cId="0" sldId="265"/>
+        </pc:sldMkLst>
+      </pc:sldChg>
+      <pc:sldChg chg="modTransition">
+        <pc:chgData name="Kellampalli Saathvik" userId="e958bb122ac88004" providerId="LiveId" clId="{00B80D4F-7DFB-43A3-9929-3FB4F844D800}" dt="2025-12-25T17:18:56.235" v="77"/>
+        <pc:sldMkLst>
+          <pc:docMk/>
+          <pc:sldMk cId="0" sldId="266"/>
+        </pc:sldMkLst>
+      </pc:sldChg>
+      <pc:sldChg chg="modTransition">
+        <pc:chgData name="Kellampalli Saathvik" userId="e958bb122ac88004" providerId="LiveId" clId="{00B80D4F-7DFB-43A3-9929-3FB4F844D800}" dt="2025-12-25T17:19:04.182" v="78"/>
+        <pc:sldMkLst>
+          <pc:docMk/>
+          <pc:sldMk cId="0" sldId="267"/>
+        </pc:sldMkLst>
+      </pc:sldChg>
+      <pc:sldChg chg="modTransition">
+        <pc:chgData name="Kellampalli Saathvik" userId="e958bb122ac88004" providerId="LiveId" clId="{00B80D4F-7DFB-43A3-9929-3FB4F844D800}" dt="2025-12-25T17:19:23.027" v="81"/>
+        <pc:sldMkLst>
+          <pc:docMk/>
+          <pc:sldMk cId="0" sldId="268"/>
+        </pc:sldMkLst>
+      </pc:sldChg>
+      <pc:sldChg chg="modTransition">
+        <pc:chgData name="Kellampalli Saathvik" userId="e958bb122ac88004" providerId="LiveId" clId="{00B80D4F-7DFB-43A3-9929-3FB4F844D800}" dt="2025-12-25T17:23:24.755" v="93"/>
+        <pc:sldMkLst>
+          <pc:docMk/>
+          <pc:sldMk cId="3536992498" sldId="269"/>
+        </pc:sldMkLst>
+      </pc:sldChg>
+      <pc:sldChg chg="modTransition">
+        <pc:chgData name="Kellampalli Saathvik" userId="e958bb122ac88004" providerId="LiveId" clId="{00B80D4F-7DFB-43A3-9929-3FB4F844D800}" dt="2025-12-25T17:17:25.956" v="63"/>
+        <pc:sldMkLst>
+          <pc:docMk/>
+          <pc:sldMk cId="1991054830" sldId="270"/>
+        </pc:sldMkLst>
+      </pc:sldChg>
+      <pc:sldChg chg="modTransition">
+        <pc:chgData name="Kellampalli Saathvik" userId="e958bb122ac88004" providerId="LiveId" clId="{00B80D4F-7DFB-43A3-9929-3FB4F844D800}" dt="2025-12-25T17:13:50.432" v="33"/>
+        <pc:sldMkLst>
+          <pc:docMk/>
+          <pc:sldMk cId="3921351209" sldId="271"/>
+        </pc:sldMkLst>
+      </pc:sldChg>
+      <pc:sldChg chg="modTransition">
+        <pc:chgData name="Kellampalli Saathvik" userId="e958bb122ac88004" providerId="LiveId" clId="{00B80D4F-7DFB-43A3-9929-3FB4F844D800}" dt="2025-12-25T17:18:43.571" v="74"/>
+        <pc:sldMkLst>
+          <pc:docMk/>
+          <pc:sldMk cId="3089918762" sldId="272"/>
+        </pc:sldMkLst>
+      </pc:sldChg>
+      <pc:sldChg chg="modTransition">
+        <pc:chgData name="Kellampalli Saathvik" userId="e958bb122ac88004" providerId="LiveId" clId="{00B80D4F-7DFB-43A3-9929-3FB4F844D800}" dt="2025-12-25T17:15:26.499" v="45"/>
+        <pc:sldMkLst>
+          <pc:docMk/>
+          <pc:sldMk cId="1034147573" sldId="273"/>
+        </pc:sldMkLst>
+      </pc:sldChg>
+      <pc:sldChg chg="modTransition">
+        <pc:chgData name="Kellampalli Saathvik" userId="e958bb122ac88004" providerId="LiveId" clId="{00B80D4F-7DFB-43A3-9929-3FB4F844D800}" dt="2025-12-25T17:15:48.422" v="49"/>
+        <pc:sldMkLst>
+          <pc:docMk/>
+          <pc:sldMk cId="609393917" sldId="274"/>
+        </pc:sldMkLst>
+      </pc:sldChg>
+      <pc:sldChg chg="modTransition">
+        <pc:chgData name="Kellampalli Saathvik" userId="e958bb122ac88004" providerId="LiveId" clId="{00B80D4F-7DFB-43A3-9929-3FB4F844D800}" dt="2025-12-25T17:17:04.877" v="61"/>
+        <pc:sldMkLst>
+          <pc:docMk/>
+          <pc:sldMk cId="3876378108" sldId="275"/>
+        </pc:sldMkLst>
+      </pc:sldChg>
+      <pc:sldChg chg="modTransition">
+        <pc:chgData name="Kellampalli Saathvik" userId="e958bb122ac88004" providerId="LiveId" clId="{00B80D4F-7DFB-43A3-9929-3FB4F844D800}" dt="2025-12-25T17:17:59.523" v="67"/>
+        <pc:sldMkLst>
+          <pc:docMk/>
+          <pc:sldMk cId="983389517" sldId="276"/>
+        </pc:sldMkLst>
+      </pc:sldChg>
+      <pc:sldChg chg="modTransition">
+        <pc:chgData name="Kellampalli Saathvik" userId="e958bb122ac88004" providerId="LiveId" clId="{00B80D4F-7DFB-43A3-9929-3FB4F844D800}" dt="2025-12-25T17:21:06.481" v="82"/>
+        <pc:sldMkLst>
+          <pc:docMk/>
+          <pc:sldMk cId="2888310472" sldId="277"/>
+        </pc:sldMkLst>
+      </pc:sldChg>
+    </pc:docChg>
+  </pc:docChgLst>
+</pc:chgInfo>
 </file>
 
 <file path=ppt/notesMasters/notesMaster1.xml><?xml version="1.0" encoding="utf-8"?>
@@ -1596,7 +1764,13 @@
       </p:grpSpPr>
       <p:sp>
         <p:nvSpPr>
-          <p:cNvPr id="2" name="Title 1"/>
+          <p:cNvPr id="2" name="Title 1">
+            <a:extLst>
+              <a:ext uri="{FF2B5EF4-FFF2-40B4-BE49-F238E27FC236}">
+                <a16:creationId xmlns:a16="http://schemas.microsoft.com/office/drawing/2014/main" id="{B6392E8F-3B53-A5C7-FAE2-F803C8A6CBC8}"/>
+              </a:ext>
+            </a:extLst>
+          </p:cNvPr>
           <p:cNvSpPr>
             <a:spLocks noGrp="1"/>
           </p:cNvSpPr>
@@ -1622,13 +1796,19 @@
               <a:rPr lang="en-US"/>
               <a:t>Click to edit Master title style</a:t>
             </a:r>
-            <a:endParaRPr lang="en-US" dirty="0"/>
+            <a:endParaRPr lang="en-IN"/>
           </a:p>
         </p:txBody>
       </p:sp>
       <p:sp>
         <p:nvSpPr>
-          <p:cNvPr id="3" name="Subtitle 2"/>
+          <p:cNvPr id="3" name="Subtitle 2">
+            <a:extLst>
+              <a:ext uri="{FF2B5EF4-FFF2-40B4-BE49-F238E27FC236}">
+                <a16:creationId xmlns:a16="http://schemas.microsoft.com/office/drawing/2014/main" id="{BD19A1DE-FFFF-3858-5708-1823EE7A8F73}"/>
+              </a:ext>
+            </a:extLst>
+          </p:cNvPr>
           <p:cNvSpPr>
             <a:spLocks noGrp="1"/>
           </p:cNvSpPr>
@@ -1687,13 +1867,19 @@
               <a:rPr lang="en-US"/>
               <a:t>Click to edit Master subtitle style</a:t>
             </a:r>
-            <a:endParaRPr lang="en-US" dirty="0"/>
+            <a:endParaRPr lang="en-IN"/>
           </a:p>
         </p:txBody>
       </p:sp>
       <p:sp>
         <p:nvSpPr>
-          <p:cNvPr id="4" name="Date Placeholder 3"/>
+          <p:cNvPr id="4" name="Date Placeholder 3">
+            <a:extLst>
+              <a:ext uri="{FF2B5EF4-FFF2-40B4-BE49-F238E27FC236}">
+                <a16:creationId xmlns:a16="http://schemas.microsoft.com/office/drawing/2014/main" id="{9C16BC71-4680-B721-A7B4-7279144A2889}"/>
+              </a:ext>
+            </a:extLst>
+          </p:cNvPr>
           <p:cNvSpPr>
             <a:spLocks noGrp="1"/>
           </p:cNvSpPr>
@@ -1707,8 +1893,8 @@
           <a:lstStyle/>
           <a:p>
             <a:fld id="{C764DE79-268F-4C1A-8933-263129D2AF90}" type="datetimeFigureOut">
-              <a:rPr lang="en-US" dirty="0"/>
-              <a:t>12/22/2025</a:t>
+              <a:rPr lang="en-US" smtClean="0"/>
+              <a:t>12/25/2025</a:t>
             </a:fld>
             <a:endParaRPr lang="en-US" dirty="0"/>
           </a:p>
@@ -1716,7 +1902,13 @@
       </p:sp>
       <p:sp>
         <p:nvSpPr>
-          <p:cNvPr id="5" name="Footer Placeholder 4"/>
+          <p:cNvPr id="5" name="Footer Placeholder 4">
+            <a:extLst>
+              <a:ext uri="{FF2B5EF4-FFF2-40B4-BE49-F238E27FC236}">
+                <a16:creationId xmlns:a16="http://schemas.microsoft.com/office/drawing/2014/main" id="{97B287BF-362E-CF98-9A49-8B19606AAB65}"/>
+              </a:ext>
+            </a:extLst>
+          </p:cNvPr>
           <p:cNvSpPr>
             <a:spLocks noGrp="1"/>
           </p:cNvSpPr>
@@ -1735,7 +1927,13 @@
       </p:sp>
       <p:sp>
         <p:nvSpPr>
-          <p:cNvPr id="6" name="Slide Number Placeholder 5"/>
+          <p:cNvPr id="6" name="Slide Number Placeholder 5">
+            <a:extLst>
+              <a:ext uri="{FF2B5EF4-FFF2-40B4-BE49-F238E27FC236}">
+                <a16:creationId xmlns:a16="http://schemas.microsoft.com/office/drawing/2014/main" id="{F61B0B68-C479-A998-7800-4B00049D6638}"/>
+              </a:ext>
+            </a:extLst>
+          </p:cNvPr>
           <p:cNvSpPr>
             <a:spLocks noGrp="1"/>
           </p:cNvSpPr>
@@ -1749,7 +1947,7 @@
           <a:lstStyle/>
           <a:p>
             <a:fld id="{48F63A3B-78C7-47BE-AE5E-E10140E04643}" type="slidenum">
-              <a:rPr lang="en-US" dirty="0"/>
+              <a:rPr lang="en-US" smtClean="0"/>
               <a:t>‹#›</a:t>
             </a:fld>
             <a:endParaRPr lang="en-US" dirty="0"/>
@@ -1759,7 +1957,7 @@
     </p:spTree>
     <p:extLst>
       <p:ext uri="{BB962C8B-B14F-4D97-AF65-F5344CB8AC3E}">
-        <p14:creationId xmlns:p14="http://schemas.microsoft.com/office/powerpoint/2010/main" val="2900010950"/>
+        <p14:creationId xmlns:p14="http://schemas.microsoft.com/office/powerpoint/2010/main" val="1773029327"/>
       </p:ext>
     </p:extLst>
   </p:cSld>
@@ -1789,7 +1987,13 @@
       </p:grpSpPr>
       <p:sp>
         <p:nvSpPr>
-          <p:cNvPr id="2" name="Title 1"/>
+          <p:cNvPr id="2" name="Title 1">
+            <a:extLst>
+              <a:ext uri="{FF2B5EF4-FFF2-40B4-BE49-F238E27FC236}">
+                <a16:creationId xmlns:a16="http://schemas.microsoft.com/office/drawing/2014/main" id="{A65D4040-0D17-8993-5B3C-B32DF9DBEC38}"/>
+              </a:ext>
+            </a:extLst>
+          </p:cNvPr>
           <p:cNvSpPr>
             <a:spLocks noGrp="1"/>
           </p:cNvSpPr>
@@ -1806,13 +2010,19 @@
               <a:rPr lang="en-US"/>
               <a:t>Click to edit Master title style</a:t>
             </a:r>
-            <a:endParaRPr lang="en-US" dirty="0"/>
+            <a:endParaRPr lang="en-IN"/>
           </a:p>
         </p:txBody>
       </p:sp>
       <p:sp>
         <p:nvSpPr>
-          <p:cNvPr id="3" name="Vertical Text Placeholder 2"/>
+          <p:cNvPr id="3" name="Vertical Text Placeholder 2">
+            <a:extLst>
+              <a:ext uri="{FF2B5EF4-FFF2-40B4-BE49-F238E27FC236}">
+                <a16:creationId xmlns:a16="http://schemas.microsoft.com/office/drawing/2014/main" id="{8FAA58BD-C6A3-0190-CE97-CB32A95013C4}"/>
+              </a:ext>
+            </a:extLst>
+          </p:cNvPr>
           <p:cNvSpPr>
             <a:spLocks noGrp="1"/>
           </p:cNvSpPr>
@@ -1858,13 +2068,19 @@
               <a:rPr lang="en-US"/>
               <a:t>Fifth level</a:t>
             </a:r>
-            <a:endParaRPr lang="en-US" dirty="0"/>
+            <a:endParaRPr lang="en-IN"/>
           </a:p>
         </p:txBody>
       </p:sp>
       <p:sp>
         <p:nvSpPr>
-          <p:cNvPr id="4" name="Date Placeholder 3"/>
+          <p:cNvPr id="4" name="Date Placeholder 3">
+            <a:extLst>
+              <a:ext uri="{FF2B5EF4-FFF2-40B4-BE49-F238E27FC236}">
+                <a16:creationId xmlns:a16="http://schemas.microsoft.com/office/drawing/2014/main" id="{13AB143B-A482-7AD2-5AE5-6995EB9E2441}"/>
+              </a:ext>
+            </a:extLst>
+          </p:cNvPr>
           <p:cNvSpPr>
             <a:spLocks noGrp="1"/>
           </p:cNvSpPr>
@@ -1878,8 +2094,8 @@
           <a:lstStyle/>
           <a:p>
             <a:fld id="{C764DE79-268F-4C1A-8933-263129D2AF90}" type="datetimeFigureOut">
-              <a:rPr lang="en-US" dirty="0"/>
-              <a:t>12/22/2025</a:t>
+              <a:rPr lang="en-US" smtClean="0"/>
+              <a:t>12/25/2025</a:t>
             </a:fld>
             <a:endParaRPr lang="en-US" dirty="0"/>
           </a:p>
@@ -1887,7 +2103,13 @@
       </p:sp>
       <p:sp>
         <p:nvSpPr>
-          <p:cNvPr id="5" name="Footer Placeholder 4"/>
+          <p:cNvPr id="5" name="Footer Placeholder 4">
+            <a:extLst>
+              <a:ext uri="{FF2B5EF4-FFF2-40B4-BE49-F238E27FC236}">
+                <a16:creationId xmlns:a16="http://schemas.microsoft.com/office/drawing/2014/main" id="{E326E1B9-060D-BAA7-CFB8-94131C25FB00}"/>
+              </a:ext>
+            </a:extLst>
+          </p:cNvPr>
           <p:cNvSpPr>
             <a:spLocks noGrp="1"/>
           </p:cNvSpPr>
@@ -1906,7 +2128,13 @@
       </p:sp>
       <p:sp>
         <p:nvSpPr>
-          <p:cNvPr id="6" name="Slide Number Placeholder 5"/>
+          <p:cNvPr id="6" name="Slide Number Placeholder 5">
+            <a:extLst>
+              <a:ext uri="{FF2B5EF4-FFF2-40B4-BE49-F238E27FC236}">
+                <a16:creationId xmlns:a16="http://schemas.microsoft.com/office/drawing/2014/main" id="{6C88BCE2-2DC3-8B63-010C-9894A3EFE890}"/>
+              </a:ext>
+            </a:extLst>
+          </p:cNvPr>
           <p:cNvSpPr>
             <a:spLocks noGrp="1"/>
           </p:cNvSpPr>
@@ -1920,7 +2148,7 @@
           <a:lstStyle/>
           <a:p>
             <a:fld id="{48F63A3B-78C7-47BE-AE5E-E10140E04643}" type="slidenum">
-              <a:rPr lang="en-US" dirty="0"/>
+              <a:rPr lang="en-US" smtClean="0"/>
               <a:t>‹#›</a:t>
             </a:fld>
             <a:endParaRPr lang="en-US" dirty="0"/>
@@ -1930,7 +2158,7 @@
     </p:spTree>
     <p:extLst>
       <p:ext uri="{BB962C8B-B14F-4D97-AF65-F5344CB8AC3E}">
-        <p14:creationId xmlns:p14="http://schemas.microsoft.com/office/powerpoint/2010/main" val="2923249956"/>
+        <p14:creationId xmlns:p14="http://schemas.microsoft.com/office/powerpoint/2010/main" val="3870895011"/>
       </p:ext>
     </p:extLst>
   </p:cSld>
@@ -1960,7 +2188,13 @@
       </p:grpSpPr>
       <p:sp>
         <p:nvSpPr>
-          <p:cNvPr id="2" name="Vertical Title 1"/>
+          <p:cNvPr id="2" name="Vertical Title 1">
+            <a:extLst>
+              <a:ext uri="{FF2B5EF4-FFF2-40B4-BE49-F238E27FC236}">
+                <a16:creationId xmlns:a16="http://schemas.microsoft.com/office/drawing/2014/main" id="{03D4D537-244C-2A32-B2C0-7918B5EE5450}"/>
+              </a:ext>
+            </a:extLst>
+          </p:cNvPr>
           <p:cNvSpPr>
             <a:spLocks noGrp="1"/>
           </p:cNvSpPr>
@@ -1982,13 +2216,19 @@
               <a:rPr lang="en-US"/>
               <a:t>Click to edit Master title style</a:t>
             </a:r>
-            <a:endParaRPr lang="en-US" dirty="0"/>
+            <a:endParaRPr lang="en-IN"/>
           </a:p>
         </p:txBody>
       </p:sp>
       <p:sp>
         <p:nvSpPr>
-          <p:cNvPr id="3" name="Vertical Text Placeholder 2"/>
+          <p:cNvPr id="3" name="Vertical Text Placeholder 2">
+            <a:extLst>
+              <a:ext uri="{FF2B5EF4-FFF2-40B4-BE49-F238E27FC236}">
+                <a16:creationId xmlns:a16="http://schemas.microsoft.com/office/drawing/2014/main" id="{60FB26A5-B564-6D1D-6651-D7137E15E1AB}"/>
+              </a:ext>
+            </a:extLst>
+          </p:cNvPr>
           <p:cNvSpPr>
             <a:spLocks noGrp="1"/>
           </p:cNvSpPr>
@@ -2039,13 +2279,19 @@
               <a:rPr lang="en-US"/>
               <a:t>Fifth level</a:t>
             </a:r>
-            <a:endParaRPr lang="en-US" dirty="0"/>
+            <a:endParaRPr lang="en-IN"/>
           </a:p>
         </p:txBody>
       </p:sp>
       <p:sp>
         <p:nvSpPr>
-          <p:cNvPr id="4" name="Date Placeholder 3"/>
+          <p:cNvPr id="4" name="Date Placeholder 3">
+            <a:extLst>
+              <a:ext uri="{FF2B5EF4-FFF2-40B4-BE49-F238E27FC236}">
+                <a16:creationId xmlns:a16="http://schemas.microsoft.com/office/drawing/2014/main" id="{7A5FFB53-5F7F-4AB7-5C3D-90764ADBB205}"/>
+              </a:ext>
+            </a:extLst>
+          </p:cNvPr>
           <p:cNvSpPr>
             <a:spLocks noGrp="1"/>
           </p:cNvSpPr>
@@ -2059,8 +2305,8 @@
           <a:lstStyle/>
           <a:p>
             <a:fld id="{C764DE79-268F-4C1A-8933-263129D2AF90}" type="datetimeFigureOut">
-              <a:rPr lang="en-US" dirty="0"/>
-              <a:t>12/22/2025</a:t>
+              <a:rPr lang="en-US" smtClean="0"/>
+              <a:t>12/25/2025</a:t>
             </a:fld>
             <a:endParaRPr lang="en-US" dirty="0"/>
           </a:p>
@@ -2068,7 +2314,13 @@
       </p:sp>
       <p:sp>
         <p:nvSpPr>
-          <p:cNvPr id="5" name="Footer Placeholder 4"/>
+          <p:cNvPr id="5" name="Footer Placeholder 4">
+            <a:extLst>
+              <a:ext uri="{FF2B5EF4-FFF2-40B4-BE49-F238E27FC236}">
+                <a16:creationId xmlns:a16="http://schemas.microsoft.com/office/drawing/2014/main" id="{7A054369-BA36-898B-6A22-40CF08ED0F0E}"/>
+              </a:ext>
+            </a:extLst>
+          </p:cNvPr>
           <p:cNvSpPr>
             <a:spLocks noGrp="1"/>
           </p:cNvSpPr>
@@ -2087,7 +2339,13 @@
       </p:sp>
       <p:sp>
         <p:nvSpPr>
-          <p:cNvPr id="6" name="Slide Number Placeholder 5"/>
+          <p:cNvPr id="6" name="Slide Number Placeholder 5">
+            <a:extLst>
+              <a:ext uri="{FF2B5EF4-FFF2-40B4-BE49-F238E27FC236}">
+                <a16:creationId xmlns:a16="http://schemas.microsoft.com/office/drawing/2014/main" id="{EDC393B9-B5A6-919F-E679-060A8BEE5390}"/>
+              </a:ext>
+            </a:extLst>
+          </p:cNvPr>
           <p:cNvSpPr>
             <a:spLocks noGrp="1"/>
           </p:cNvSpPr>
@@ -2101,7 +2359,7 @@
           <a:lstStyle/>
           <a:p>
             <a:fld id="{48F63A3B-78C7-47BE-AE5E-E10140E04643}" type="slidenum">
-              <a:rPr lang="en-US" dirty="0"/>
+              <a:rPr lang="en-US" smtClean="0"/>
               <a:t>‹#›</a:t>
             </a:fld>
             <a:endParaRPr lang="en-US" dirty="0"/>
@@ -2111,7 +2369,7 @@
     </p:spTree>
     <p:extLst>
       <p:ext uri="{BB962C8B-B14F-4D97-AF65-F5344CB8AC3E}">
-        <p14:creationId xmlns:p14="http://schemas.microsoft.com/office/powerpoint/2010/main" val="4223465147"/>
+        <p14:creationId xmlns:p14="http://schemas.microsoft.com/office/powerpoint/2010/main" val="4114250513"/>
       </p:ext>
     </p:extLst>
   </p:cSld>
@@ -2147,7 +2405,7 @@
     </p:spTree>
     <p:extLst>
       <p:ext uri="{BB962C8B-B14F-4D97-AF65-F5344CB8AC3E}">
-        <p14:creationId xmlns:p14="http://schemas.microsoft.com/office/powerpoint/2010/main" val="1130906938"/>
+        <p14:creationId xmlns:p14="http://schemas.microsoft.com/office/powerpoint/2010/main" val="1050406073"/>
       </p:ext>
     </p:extLst>
   </p:cSld>
@@ -2176,7 +2434,13 @@
       </p:grpSpPr>
       <p:sp>
         <p:nvSpPr>
-          <p:cNvPr id="2" name="Title 1"/>
+          <p:cNvPr id="2" name="Title 1">
+            <a:extLst>
+              <a:ext uri="{FF2B5EF4-FFF2-40B4-BE49-F238E27FC236}">
+                <a16:creationId xmlns:a16="http://schemas.microsoft.com/office/drawing/2014/main" id="{AD0E09EA-4FDA-834F-A09C-34FFE06DE54C}"/>
+              </a:ext>
+            </a:extLst>
+          </p:cNvPr>
           <p:cNvSpPr>
             <a:spLocks noGrp="1"/>
           </p:cNvSpPr>
@@ -2193,13 +2457,19 @@
               <a:rPr lang="en-US"/>
               <a:t>Click to edit Master title style</a:t>
             </a:r>
-            <a:endParaRPr lang="en-US" dirty="0"/>
+            <a:endParaRPr lang="en-IN"/>
           </a:p>
         </p:txBody>
       </p:sp>
       <p:sp>
         <p:nvSpPr>
-          <p:cNvPr id="3" name="Content Placeholder 2"/>
+          <p:cNvPr id="3" name="Content Placeholder 2">
+            <a:extLst>
+              <a:ext uri="{FF2B5EF4-FFF2-40B4-BE49-F238E27FC236}">
+                <a16:creationId xmlns:a16="http://schemas.microsoft.com/office/drawing/2014/main" id="{2E88073C-C6FC-5648-8A8F-92145274B264}"/>
+              </a:ext>
+            </a:extLst>
+          </p:cNvPr>
           <p:cNvSpPr>
             <a:spLocks noGrp="1"/>
           </p:cNvSpPr>
@@ -2245,13 +2515,19 @@
               <a:rPr lang="en-US"/>
               <a:t>Fifth level</a:t>
             </a:r>
-            <a:endParaRPr lang="en-US" dirty="0"/>
+            <a:endParaRPr lang="en-IN"/>
           </a:p>
         </p:txBody>
       </p:sp>
       <p:sp>
         <p:nvSpPr>
-          <p:cNvPr id="4" name="Date Placeholder 3"/>
+          <p:cNvPr id="4" name="Date Placeholder 3">
+            <a:extLst>
+              <a:ext uri="{FF2B5EF4-FFF2-40B4-BE49-F238E27FC236}">
+                <a16:creationId xmlns:a16="http://schemas.microsoft.com/office/drawing/2014/main" id="{BB40B25B-2AFD-52A3-735C-3EE82D8CDBC5}"/>
+              </a:ext>
+            </a:extLst>
+          </p:cNvPr>
           <p:cNvSpPr>
             <a:spLocks noGrp="1"/>
           </p:cNvSpPr>
@@ -2265,8 +2541,8 @@
           <a:lstStyle/>
           <a:p>
             <a:fld id="{C764DE79-268F-4C1A-8933-263129D2AF90}" type="datetimeFigureOut">
-              <a:rPr lang="en-US" dirty="0"/>
-              <a:t>12/22/2025</a:t>
+              <a:rPr lang="en-US" smtClean="0"/>
+              <a:t>12/25/2025</a:t>
             </a:fld>
             <a:endParaRPr lang="en-US" dirty="0"/>
           </a:p>
@@ -2274,7 +2550,13 @@
       </p:sp>
       <p:sp>
         <p:nvSpPr>
-          <p:cNvPr id="5" name="Footer Placeholder 4"/>
+          <p:cNvPr id="5" name="Footer Placeholder 4">
+            <a:extLst>
+              <a:ext uri="{FF2B5EF4-FFF2-40B4-BE49-F238E27FC236}">
+                <a16:creationId xmlns:a16="http://schemas.microsoft.com/office/drawing/2014/main" id="{B516AF42-8F4A-E740-AC11-A3D244BF17EB}"/>
+              </a:ext>
+            </a:extLst>
+          </p:cNvPr>
           <p:cNvSpPr>
             <a:spLocks noGrp="1"/>
           </p:cNvSpPr>
@@ -2293,7 +2575,13 @@
       </p:sp>
       <p:sp>
         <p:nvSpPr>
-          <p:cNvPr id="6" name="Slide Number Placeholder 5"/>
+          <p:cNvPr id="6" name="Slide Number Placeholder 5">
+            <a:extLst>
+              <a:ext uri="{FF2B5EF4-FFF2-40B4-BE49-F238E27FC236}">
+                <a16:creationId xmlns:a16="http://schemas.microsoft.com/office/drawing/2014/main" id="{AAF12FE9-588E-62D7-6E82-71607E231104}"/>
+              </a:ext>
+            </a:extLst>
+          </p:cNvPr>
           <p:cNvSpPr>
             <a:spLocks noGrp="1"/>
           </p:cNvSpPr>
@@ -2307,7 +2595,7 @@
           <a:lstStyle/>
           <a:p>
             <a:fld id="{48F63A3B-78C7-47BE-AE5E-E10140E04643}" type="slidenum">
-              <a:rPr lang="en-US" dirty="0"/>
+              <a:rPr lang="en-US" smtClean="0"/>
               <a:t>‹#›</a:t>
             </a:fld>
             <a:endParaRPr lang="en-US" dirty="0"/>
@@ -2317,7 +2605,7 @@
     </p:spTree>
     <p:extLst>
       <p:ext uri="{BB962C8B-B14F-4D97-AF65-F5344CB8AC3E}">
-        <p14:creationId xmlns:p14="http://schemas.microsoft.com/office/powerpoint/2010/main" val="3785633683"/>
+        <p14:creationId xmlns:p14="http://schemas.microsoft.com/office/powerpoint/2010/main" val="2551578044"/>
       </p:ext>
     </p:extLst>
   </p:cSld>
@@ -2347,7 +2635,13 @@
       </p:grpSpPr>
       <p:sp>
         <p:nvSpPr>
-          <p:cNvPr id="2" name="Title 1"/>
+          <p:cNvPr id="2" name="Title 1">
+            <a:extLst>
+              <a:ext uri="{FF2B5EF4-FFF2-40B4-BE49-F238E27FC236}">
+                <a16:creationId xmlns:a16="http://schemas.microsoft.com/office/drawing/2014/main" id="{AACF9794-12AA-4F55-AE2C-27DC49FA7F13}"/>
+              </a:ext>
+            </a:extLst>
+          </p:cNvPr>
           <p:cNvSpPr>
             <a:spLocks noGrp="1"/>
           </p:cNvSpPr>
@@ -2373,13 +2667,19 @@
               <a:rPr lang="en-US"/>
               <a:t>Click to edit Master title style</a:t>
             </a:r>
-            <a:endParaRPr lang="en-US" dirty="0"/>
+            <a:endParaRPr lang="en-IN"/>
           </a:p>
         </p:txBody>
       </p:sp>
       <p:sp>
         <p:nvSpPr>
-          <p:cNvPr id="3" name="Text Placeholder 2"/>
+          <p:cNvPr id="3" name="Text Placeholder 2">
+            <a:extLst>
+              <a:ext uri="{FF2B5EF4-FFF2-40B4-BE49-F238E27FC236}">
+                <a16:creationId xmlns:a16="http://schemas.microsoft.com/office/drawing/2014/main" id="{DFBB2CF1-70C2-77DE-1D93-10CE0B211858}"/>
+              </a:ext>
+            </a:extLst>
+          </p:cNvPr>
           <p:cNvSpPr>
             <a:spLocks noGrp="1"/>
           </p:cNvSpPr>
@@ -2401,7 +2701,7 @@
               <a:defRPr sz="1800">
                 <a:solidFill>
                   <a:schemeClr val="tx1">
-                    <a:tint val="75000"/>
+                    <a:tint val="82000"/>
                   </a:schemeClr>
                 </a:solidFill>
               </a:defRPr>
@@ -2411,7 +2711,7 @@
               <a:defRPr sz="1500">
                 <a:solidFill>
                   <a:schemeClr val="tx1">
-                    <a:tint val="75000"/>
+                    <a:tint val="82000"/>
                   </a:schemeClr>
                 </a:solidFill>
               </a:defRPr>
@@ -2421,7 +2721,7 @@
               <a:defRPr sz="1350">
                 <a:solidFill>
                   <a:schemeClr val="tx1">
-                    <a:tint val="75000"/>
+                    <a:tint val="82000"/>
                   </a:schemeClr>
                 </a:solidFill>
               </a:defRPr>
@@ -2431,7 +2731,7 @@
               <a:defRPr sz="1200">
                 <a:solidFill>
                   <a:schemeClr val="tx1">
-                    <a:tint val="75000"/>
+                    <a:tint val="82000"/>
                   </a:schemeClr>
                 </a:solidFill>
               </a:defRPr>
@@ -2441,7 +2741,7 @@
               <a:defRPr sz="1200">
                 <a:solidFill>
                   <a:schemeClr val="tx1">
-                    <a:tint val="75000"/>
+                    <a:tint val="82000"/>
                   </a:schemeClr>
                 </a:solidFill>
               </a:defRPr>
@@ -2451,7 +2751,7 @@
               <a:defRPr sz="1200">
                 <a:solidFill>
                   <a:schemeClr val="tx1">
-                    <a:tint val="75000"/>
+                    <a:tint val="82000"/>
                   </a:schemeClr>
                 </a:solidFill>
               </a:defRPr>
@@ -2461,7 +2761,7 @@
               <a:defRPr sz="1200">
                 <a:solidFill>
                   <a:schemeClr val="tx1">
-                    <a:tint val="75000"/>
+                    <a:tint val="82000"/>
                   </a:schemeClr>
                 </a:solidFill>
               </a:defRPr>
@@ -2471,7 +2771,7 @@
               <a:defRPr sz="1200">
                 <a:solidFill>
                   <a:schemeClr val="tx1">
-                    <a:tint val="75000"/>
+                    <a:tint val="82000"/>
                   </a:schemeClr>
                 </a:solidFill>
               </a:defRPr>
@@ -2481,7 +2781,7 @@
               <a:defRPr sz="1200">
                 <a:solidFill>
                   <a:schemeClr val="tx1">
-                    <a:tint val="75000"/>
+                    <a:tint val="82000"/>
                   </a:schemeClr>
                 </a:solidFill>
               </a:defRPr>
@@ -2498,7 +2798,13 @@
       </p:sp>
       <p:sp>
         <p:nvSpPr>
-          <p:cNvPr id="4" name="Date Placeholder 3"/>
+          <p:cNvPr id="4" name="Date Placeholder 3">
+            <a:extLst>
+              <a:ext uri="{FF2B5EF4-FFF2-40B4-BE49-F238E27FC236}">
+                <a16:creationId xmlns:a16="http://schemas.microsoft.com/office/drawing/2014/main" id="{6C45E3DF-14DE-0C66-034D-1DF2DD96762E}"/>
+              </a:ext>
+            </a:extLst>
+          </p:cNvPr>
           <p:cNvSpPr>
             <a:spLocks noGrp="1"/>
           </p:cNvSpPr>
@@ -2512,8 +2818,8 @@
           <a:lstStyle/>
           <a:p>
             <a:fld id="{C764DE79-268F-4C1A-8933-263129D2AF90}" type="datetimeFigureOut">
-              <a:rPr lang="en-US" dirty="0"/>
-              <a:t>12/22/2025</a:t>
+              <a:rPr lang="en-US" smtClean="0"/>
+              <a:t>12/25/2025</a:t>
             </a:fld>
             <a:endParaRPr lang="en-US" dirty="0"/>
           </a:p>
@@ -2521,7 +2827,13 @@
       </p:sp>
       <p:sp>
         <p:nvSpPr>
-          <p:cNvPr id="5" name="Footer Placeholder 4"/>
+          <p:cNvPr id="5" name="Footer Placeholder 4">
+            <a:extLst>
+              <a:ext uri="{FF2B5EF4-FFF2-40B4-BE49-F238E27FC236}">
+                <a16:creationId xmlns:a16="http://schemas.microsoft.com/office/drawing/2014/main" id="{FC171243-67CA-A96F-B831-AAF1960DB039}"/>
+              </a:ext>
+            </a:extLst>
+          </p:cNvPr>
           <p:cNvSpPr>
             <a:spLocks noGrp="1"/>
           </p:cNvSpPr>
@@ -2540,7 +2852,13 @@
       </p:sp>
       <p:sp>
         <p:nvSpPr>
-          <p:cNvPr id="6" name="Slide Number Placeholder 5"/>
+          <p:cNvPr id="6" name="Slide Number Placeholder 5">
+            <a:extLst>
+              <a:ext uri="{FF2B5EF4-FFF2-40B4-BE49-F238E27FC236}">
+                <a16:creationId xmlns:a16="http://schemas.microsoft.com/office/drawing/2014/main" id="{BB912F4A-1CE1-842F-3E24-5AAB1089E3A6}"/>
+              </a:ext>
+            </a:extLst>
+          </p:cNvPr>
           <p:cNvSpPr>
             <a:spLocks noGrp="1"/>
           </p:cNvSpPr>
@@ -2554,7 +2872,7 @@
           <a:lstStyle/>
           <a:p>
             <a:fld id="{48F63A3B-78C7-47BE-AE5E-E10140E04643}" type="slidenum">
-              <a:rPr lang="en-US" dirty="0"/>
+              <a:rPr lang="en-US" smtClean="0"/>
               <a:t>‹#›</a:t>
             </a:fld>
             <a:endParaRPr lang="en-US" dirty="0"/>
@@ -2564,7 +2882,7 @@
     </p:spTree>
     <p:extLst>
       <p:ext uri="{BB962C8B-B14F-4D97-AF65-F5344CB8AC3E}">
-        <p14:creationId xmlns:p14="http://schemas.microsoft.com/office/powerpoint/2010/main" val="471292297"/>
+        <p14:creationId xmlns:p14="http://schemas.microsoft.com/office/powerpoint/2010/main" val="228852407"/>
       </p:ext>
     </p:extLst>
   </p:cSld>
@@ -2594,7 +2912,13 @@
       </p:grpSpPr>
       <p:sp>
         <p:nvSpPr>
-          <p:cNvPr id="2" name="Title 1"/>
+          <p:cNvPr id="2" name="Title 1">
+            <a:extLst>
+              <a:ext uri="{FF2B5EF4-FFF2-40B4-BE49-F238E27FC236}">
+                <a16:creationId xmlns:a16="http://schemas.microsoft.com/office/drawing/2014/main" id="{1CF63ECA-410C-7E32-14A3-3DF1782658F6}"/>
+              </a:ext>
+            </a:extLst>
+          </p:cNvPr>
           <p:cNvSpPr>
             <a:spLocks noGrp="1"/>
           </p:cNvSpPr>
@@ -2611,13 +2935,19 @@
               <a:rPr lang="en-US"/>
               <a:t>Click to edit Master title style</a:t>
             </a:r>
-            <a:endParaRPr lang="en-US" dirty="0"/>
+            <a:endParaRPr lang="en-IN"/>
           </a:p>
         </p:txBody>
       </p:sp>
       <p:sp>
         <p:nvSpPr>
-          <p:cNvPr id="3" name="Content Placeholder 2"/>
+          <p:cNvPr id="3" name="Content Placeholder 2">
+            <a:extLst>
+              <a:ext uri="{FF2B5EF4-FFF2-40B4-BE49-F238E27FC236}">
+                <a16:creationId xmlns:a16="http://schemas.microsoft.com/office/drawing/2014/main" id="{6A2DF1BD-C8AD-C446-E375-F99C84C9DCDC}"/>
+              </a:ext>
+            </a:extLst>
+          </p:cNvPr>
           <p:cNvSpPr>
             <a:spLocks noGrp="1"/>
           </p:cNvSpPr>
@@ -2668,13 +2998,19 @@
               <a:rPr lang="en-US"/>
               <a:t>Fifth level</a:t>
             </a:r>
-            <a:endParaRPr lang="en-US" dirty="0"/>
+            <a:endParaRPr lang="en-IN"/>
           </a:p>
         </p:txBody>
       </p:sp>
       <p:sp>
         <p:nvSpPr>
-          <p:cNvPr id="4" name="Content Placeholder 3"/>
+          <p:cNvPr id="4" name="Content Placeholder 3">
+            <a:extLst>
+              <a:ext uri="{FF2B5EF4-FFF2-40B4-BE49-F238E27FC236}">
+                <a16:creationId xmlns:a16="http://schemas.microsoft.com/office/drawing/2014/main" id="{8E88C6CB-DCE4-2A61-AE4B-7D66BE1C294E}"/>
+              </a:ext>
+            </a:extLst>
+          </p:cNvPr>
           <p:cNvSpPr>
             <a:spLocks noGrp="1"/>
           </p:cNvSpPr>
@@ -2725,13 +3061,19 @@
               <a:rPr lang="en-US"/>
               <a:t>Fifth level</a:t>
             </a:r>
-            <a:endParaRPr lang="en-US" dirty="0"/>
+            <a:endParaRPr lang="en-IN"/>
           </a:p>
         </p:txBody>
       </p:sp>
       <p:sp>
         <p:nvSpPr>
-          <p:cNvPr id="5" name="Date Placeholder 4"/>
+          <p:cNvPr id="5" name="Date Placeholder 4">
+            <a:extLst>
+              <a:ext uri="{FF2B5EF4-FFF2-40B4-BE49-F238E27FC236}">
+                <a16:creationId xmlns:a16="http://schemas.microsoft.com/office/drawing/2014/main" id="{75F76DD2-0BC7-2C19-56C8-8921A305B1BA}"/>
+              </a:ext>
+            </a:extLst>
+          </p:cNvPr>
           <p:cNvSpPr>
             <a:spLocks noGrp="1"/>
           </p:cNvSpPr>
@@ -2745,8 +3087,8 @@
           <a:lstStyle/>
           <a:p>
             <a:fld id="{C764DE79-268F-4C1A-8933-263129D2AF90}" type="datetimeFigureOut">
-              <a:rPr lang="en-US" dirty="0"/>
-              <a:t>12/22/2025</a:t>
+              <a:rPr lang="en-US" smtClean="0"/>
+              <a:t>12/25/2025</a:t>
             </a:fld>
             <a:endParaRPr lang="en-US" dirty="0"/>
           </a:p>
@@ -2754,7 +3096,13 @@
       </p:sp>
       <p:sp>
         <p:nvSpPr>
-          <p:cNvPr id="6" name="Footer Placeholder 5"/>
+          <p:cNvPr id="6" name="Footer Placeholder 5">
+            <a:extLst>
+              <a:ext uri="{FF2B5EF4-FFF2-40B4-BE49-F238E27FC236}">
+                <a16:creationId xmlns:a16="http://schemas.microsoft.com/office/drawing/2014/main" id="{285BF1E8-F37C-52A9-EDF2-1D94D5DF5D53}"/>
+              </a:ext>
+            </a:extLst>
+          </p:cNvPr>
           <p:cNvSpPr>
             <a:spLocks noGrp="1"/>
           </p:cNvSpPr>
@@ -2773,7 +3121,13 @@
       </p:sp>
       <p:sp>
         <p:nvSpPr>
-          <p:cNvPr id="7" name="Slide Number Placeholder 6"/>
+          <p:cNvPr id="7" name="Slide Number Placeholder 6">
+            <a:extLst>
+              <a:ext uri="{FF2B5EF4-FFF2-40B4-BE49-F238E27FC236}">
+                <a16:creationId xmlns:a16="http://schemas.microsoft.com/office/drawing/2014/main" id="{E6E4D353-26C3-37A3-CB9F-4A0319E0896E}"/>
+              </a:ext>
+            </a:extLst>
+          </p:cNvPr>
           <p:cNvSpPr>
             <a:spLocks noGrp="1"/>
           </p:cNvSpPr>
@@ -2787,7 +3141,7 @@
           <a:lstStyle/>
           <a:p>
             <a:fld id="{48F63A3B-78C7-47BE-AE5E-E10140E04643}" type="slidenum">
-              <a:rPr lang="en-US" dirty="0"/>
+              <a:rPr lang="en-US" smtClean="0"/>
               <a:t>‹#›</a:t>
             </a:fld>
             <a:endParaRPr lang="en-US" dirty="0"/>
@@ -2797,7 +3151,7 @@
     </p:spTree>
     <p:extLst>
       <p:ext uri="{BB962C8B-B14F-4D97-AF65-F5344CB8AC3E}">
-        <p14:creationId xmlns:p14="http://schemas.microsoft.com/office/powerpoint/2010/main" val="3469193840"/>
+        <p14:creationId xmlns:p14="http://schemas.microsoft.com/office/powerpoint/2010/main" val="1652533013"/>
       </p:ext>
     </p:extLst>
   </p:cSld>
@@ -2827,7 +3181,13 @@
       </p:grpSpPr>
       <p:sp>
         <p:nvSpPr>
-          <p:cNvPr id="2" name="Title 1"/>
+          <p:cNvPr id="2" name="Title 1">
+            <a:extLst>
+              <a:ext uri="{FF2B5EF4-FFF2-40B4-BE49-F238E27FC236}">
+                <a16:creationId xmlns:a16="http://schemas.microsoft.com/office/drawing/2014/main" id="{7F7A88B8-2F2B-96DC-944A-C66A77835004}"/>
+              </a:ext>
+            </a:extLst>
+          </p:cNvPr>
           <p:cNvSpPr>
             <a:spLocks noGrp="1"/>
           </p:cNvSpPr>
@@ -2849,13 +3209,19 @@
               <a:rPr lang="en-US"/>
               <a:t>Click to edit Master title style</a:t>
             </a:r>
-            <a:endParaRPr lang="en-US" dirty="0"/>
+            <a:endParaRPr lang="en-IN"/>
           </a:p>
         </p:txBody>
       </p:sp>
       <p:sp>
         <p:nvSpPr>
-          <p:cNvPr id="3" name="Text Placeholder 2"/>
+          <p:cNvPr id="3" name="Text Placeholder 2">
+            <a:extLst>
+              <a:ext uri="{FF2B5EF4-FFF2-40B4-BE49-F238E27FC236}">
+                <a16:creationId xmlns:a16="http://schemas.microsoft.com/office/drawing/2014/main" id="{3229646A-514C-D24C-91EE-E0BC5FB59697}"/>
+              </a:ext>
+            </a:extLst>
+          </p:cNvPr>
           <p:cNvSpPr>
             <a:spLocks noGrp="1"/>
           </p:cNvSpPr>
@@ -2920,7 +3286,13 @@
       </p:sp>
       <p:sp>
         <p:nvSpPr>
-          <p:cNvPr id="4" name="Content Placeholder 3"/>
+          <p:cNvPr id="4" name="Content Placeholder 3">
+            <a:extLst>
+              <a:ext uri="{FF2B5EF4-FFF2-40B4-BE49-F238E27FC236}">
+                <a16:creationId xmlns:a16="http://schemas.microsoft.com/office/drawing/2014/main" id="{D5F339A7-E498-B475-F135-B009A2434324}"/>
+              </a:ext>
+            </a:extLst>
+          </p:cNvPr>
           <p:cNvSpPr>
             <a:spLocks noGrp="1"/>
           </p:cNvSpPr>
@@ -2971,13 +3343,19 @@
               <a:rPr lang="en-US"/>
               <a:t>Fifth level</a:t>
             </a:r>
-            <a:endParaRPr lang="en-US" dirty="0"/>
+            <a:endParaRPr lang="en-IN"/>
           </a:p>
         </p:txBody>
       </p:sp>
       <p:sp>
         <p:nvSpPr>
-          <p:cNvPr id="5" name="Text Placeholder 4"/>
+          <p:cNvPr id="5" name="Text Placeholder 4">
+            <a:extLst>
+              <a:ext uri="{FF2B5EF4-FFF2-40B4-BE49-F238E27FC236}">
+                <a16:creationId xmlns:a16="http://schemas.microsoft.com/office/drawing/2014/main" id="{3D1E0B6B-C806-EC0A-810A-44A4D9202E96}"/>
+              </a:ext>
+            </a:extLst>
+          </p:cNvPr>
           <p:cNvSpPr>
             <a:spLocks noGrp="1"/>
           </p:cNvSpPr>
@@ -3042,7 +3420,13 @@
       </p:sp>
       <p:sp>
         <p:nvSpPr>
-          <p:cNvPr id="6" name="Content Placeholder 5"/>
+          <p:cNvPr id="6" name="Content Placeholder 5">
+            <a:extLst>
+              <a:ext uri="{FF2B5EF4-FFF2-40B4-BE49-F238E27FC236}">
+                <a16:creationId xmlns:a16="http://schemas.microsoft.com/office/drawing/2014/main" id="{A1A2860B-8CCC-B5AD-5BD2-7B64B77A0A25}"/>
+              </a:ext>
+            </a:extLst>
+          </p:cNvPr>
           <p:cNvSpPr>
             <a:spLocks noGrp="1"/>
           </p:cNvSpPr>
@@ -3093,13 +3477,19 @@
               <a:rPr lang="en-US"/>
               <a:t>Fifth level</a:t>
             </a:r>
-            <a:endParaRPr lang="en-US" dirty="0"/>
+            <a:endParaRPr lang="en-IN"/>
           </a:p>
         </p:txBody>
       </p:sp>
       <p:sp>
         <p:nvSpPr>
-          <p:cNvPr id="7" name="Date Placeholder 6"/>
+          <p:cNvPr id="7" name="Date Placeholder 6">
+            <a:extLst>
+              <a:ext uri="{FF2B5EF4-FFF2-40B4-BE49-F238E27FC236}">
+                <a16:creationId xmlns:a16="http://schemas.microsoft.com/office/drawing/2014/main" id="{D004F4EA-E944-5DB1-EFC4-DFA4BAD0ECA4}"/>
+              </a:ext>
+            </a:extLst>
+          </p:cNvPr>
           <p:cNvSpPr>
             <a:spLocks noGrp="1"/>
           </p:cNvSpPr>
@@ -3113,8 +3503,8 @@
           <a:lstStyle/>
           <a:p>
             <a:fld id="{C764DE79-268F-4C1A-8933-263129D2AF90}" type="datetimeFigureOut">
-              <a:rPr lang="en-US" dirty="0"/>
-              <a:t>12/22/2025</a:t>
+              <a:rPr lang="en-US" smtClean="0"/>
+              <a:t>12/25/2025</a:t>
             </a:fld>
             <a:endParaRPr lang="en-US" dirty="0"/>
           </a:p>
@@ -3122,7 +3512,13 @@
       </p:sp>
       <p:sp>
         <p:nvSpPr>
-          <p:cNvPr id="8" name="Footer Placeholder 7"/>
+          <p:cNvPr id="8" name="Footer Placeholder 7">
+            <a:extLst>
+              <a:ext uri="{FF2B5EF4-FFF2-40B4-BE49-F238E27FC236}">
+                <a16:creationId xmlns:a16="http://schemas.microsoft.com/office/drawing/2014/main" id="{C7AF5C04-8CEB-261A-18D5-97095BB8FD45}"/>
+              </a:ext>
+            </a:extLst>
+          </p:cNvPr>
           <p:cNvSpPr>
             <a:spLocks noGrp="1"/>
           </p:cNvSpPr>
@@ -3141,7 +3537,13 @@
       </p:sp>
       <p:sp>
         <p:nvSpPr>
-          <p:cNvPr id="9" name="Slide Number Placeholder 8"/>
+          <p:cNvPr id="9" name="Slide Number Placeholder 8">
+            <a:extLst>
+              <a:ext uri="{FF2B5EF4-FFF2-40B4-BE49-F238E27FC236}">
+                <a16:creationId xmlns:a16="http://schemas.microsoft.com/office/drawing/2014/main" id="{64C96D78-733E-1A91-D7A5-966ACBEFA09E}"/>
+              </a:ext>
+            </a:extLst>
+          </p:cNvPr>
           <p:cNvSpPr>
             <a:spLocks noGrp="1"/>
           </p:cNvSpPr>
@@ -3155,7 +3557,7 @@
           <a:lstStyle/>
           <a:p>
             <a:fld id="{48F63A3B-78C7-47BE-AE5E-E10140E04643}" type="slidenum">
-              <a:rPr lang="en-US" dirty="0"/>
+              <a:rPr lang="en-US" smtClean="0"/>
               <a:t>‹#›</a:t>
             </a:fld>
             <a:endParaRPr lang="en-US" dirty="0"/>
@@ -3165,7 +3567,7 @@
     </p:spTree>
     <p:extLst>
       <p:ext uri="{BB962C8B-B14F-4D97-AF65-F5344CB8AC3E}">
-        <p14:creationId xmlns:p14="http://schemas.microsoft.com/office/powerpoint/2010/main" val="3276601359"/>
+        <p14:creationId xmlns:p14="http://schemas.microsoft.com/office/powerpoint/2010/main" val="1695920752"/>
       </p:ext>
     </p:extLst>
   </p:cSld>
@@ -3195,7 +3597,13 @@
       </p:grpSpPr>
       <p:sp>
         <p:nvSpPr>
-          <p:cNvPr id="2" name="Title 1"/>
+          <p:cNvPr id="2" name="Title 1">
+            <a:extLst>
+              <a:ext uri="{FF2B5EF4-FFF2-40B4-BE49-F238E27FC236}">
+                <a16:creationId xmlns:a16="http://schemas.microsoft.com/office/drawing/2014/main" id="{5B961972-C4AC-A175-ABAF-2C4E2B5C378C}"/>
+              </a:ext>
+            </a:extLst>
+          </p:cNvPr>
           <p:cNvSpPr>
             <a:spLocks noGrp="1"/>
           </p:cNvSpPr>
@@ -3212,13 +3620,19 @@
               <a:rPr lang="en-US"/>
               <a:t>Click to edit Master title style</a:t>
             </a:r>
-            <a:endParaRPr lang="en-US" dirty="0"/>
+            <a:endParaRPr lang="en-IN"/>
           </a:p>
         </p:txBody>
       </p:sp>
       <p:sp>
         <p:nvSpPr>
-          <p:cNvPr id="3" name="Date Placeholder 2"/>
+          <p:cNvPr id="3" name="Date Placeholder 2">
+            <a:extLst>
+              <a:ext uri="{FF2B5EF4-FFF2-40B4-BE49-F238E27FC236}">
+                <a16:creationId xmlns:a16="http://schemas.microsoft.com/office/drawing/2014/main" id="{BC406928-1134-B716-6882-A9C50683D108}"/>
+              </a:ext>
+            </a:extLst>
+          </p:cNvPr>
           <p:cNvSpPr>
             <a:spLocks noGrp="1"/>
           </p:cNvSpPr>
@@ -3232,8 +3646,8 @@
           <a:lstStyle/>
           <a:p>
             <a:fld id="{C764DE79-268F-4C1A-8933-263129D2AF90}" type="datetimeFigureOut">
-              <a:rPr lang="en-US" dirty="0"/>
-              <a:t>12/22/2025</a:t>
+              <a:rPr lang="en-US" smtClean="0"/>
+              <a:t>12/25/2025</a:t>
             </a:fld>
             <a:endParaRPr lang="en-US" dirty="0"/>
           </a:p>
@@ -3241,7 +3655,13 @@
       </p:sp>
       <p:sp>
         <p:nvSpPr>
-          <p:cNvPr id="4" name="Footer Placeholder 3"/>
+          <p:cNvPr id="4" name="Footer Placeholder 3">
+            <a:extLst>
+              <a:ext uri="{FF2B5EF4-FFF2-40B4-BE49-F238E27FC236}">
+                <a16:creationId xmlns:a16="http://schemas.microsoft.com/office/drawing/2014/main" id="{23C835E6-F9C2-1CB8-1993-38CE5505EF5E}"/>
+              </a:ext>
+            </a:extLst>
+          </p:cNvPr>
           <p:cNvSpPr>
             <a:spLocks noGrp="1"/>
           </p:cNvSpPr>
@@ -3260,7 +3680,13 @@
       </p:sp>
       <p:sp>
         <p:nvSpPr>
-          <p:cNvPr id="5" name="Slide Number Placeholder 4"/>
+          <p:cNvPr id="5" name="Slide Number Placeholder 4">
+            <a:extLst>
+              <a:ext uri="{FF2B5EF4-FFF2-40B4-BE49-F238E27FC236}">
+                <a16:creationId xmlns:a16="http://schemas.microsoft.com/office/drawing/2014/main" id="{28DC120E-5702-72B7-E603-E26FA5658CBF}"/>
+              </a:ext>
+            </a:extLst>
+          </p:cNvPr>
           <p:cNvSpPr>
             <a:spLocks noGrp="1"/>
           </p:cNvSpPr>
@@ -3274,7 +3700,7 @@
           <a:lstStyle/>
           <a:p>
             <a:fld id="{48F63A3B-78C7-47BE-AE5E-E10140E04643}" type="slidenum">
-              <a:rPr lang="en-US" dirty="0"/>
+              <a:rPr lang="en-US" smtClean="0"/>
               <a:t>‹#›</a:t>
             </a:fld>
             <a:endParaRPr lang="en-US" dirty="0"/>
@@ -3284,7 +3710,7 @@
     </p:spTree>
     <p:extLst>
       <p:ext uri="{BB962C8B-B14F-4D97-AF65-F5344CB8AC3E}">
-        <p14:creationId xmlns:p14="http://schemas.microsoft.com/office/powerpoint/2010/main" val="2525542337"/>
+        <p14:creationId xmlns:p14="http://schemas.microsoft.com/office/powerpoint/2010/main" val="1093748024"/>
       </p:ext>
     </p:extLst>
   </p:cSld>
@@ -3314,7 +3740,13 @@
       </p:grpSpPr>
       <p:sp>
         <p:nvSpPr>
-          <p:cNvPr id="2" name="Date Placeholder 1"/>
+          <p:cNvPr id="2" name="Date Placeholder 1">
+            <a:extLst>
+              <a:ext uri="{FF2B5EF4-FFF2-40B4-BE49-F238E27FC236}">
+                <a16:creationId xmlns:a16="http://schemas.microsoft.com/office/drawing/2014/main" id="{E01272F5-E828-B11E-2FAB-B8C4C8EB8168}"/>
+              </a:ext>
+            </a:extLst>
+          </p:cNvPr>
           <p:cNvSpPr>
             <a:spLocks noGrp="1"/>
           </p:cNvSpPr>
@@ -3328,8 +3760,8 @@
           <a:lstStyle/>
           <a:p>
             <a:fld id="{C764DE79-268F-4C1A-8933-263129D2AF90}" type="datetimeFigureOut">
-              <a:rPr lang="en-US" dirty="0"/>
-              <a:t>12/22/2025</a:t>
+              <a:rPr lang="en-US" smtClean="0"/>
+              <a:t>12/25/2025</a:t>
             </a:fld>
             <a:endParaRPr lang="en-US" dirty="0"/>
           </a:p>
@@ -3337,7 +3769,13 @@
       </p:sp>
       <p:sp>
         <p:nvSpPr>
-          <p:cNvPr id="3" name="Footer Placeholder 2"/>
+          <p:cNvPr id="3" name="Footer Placeholder 2">
+            <a:extLst>
+              <a:ext uri="{FF2B5EF4-FFF2-40B4-BE49-F238E27FC236}">
+                <a16:creationId xmlns:a16="http://schemas.microsoft.com/office/drawing/2014/main" id="{90AF9C8C-B614-2EA2-C832-8CDF522925E6}"/>
+              </a:ext>
+            </a:extLst>
+          </p:cNvPr>
           <p:cNvSpPr>
             <a:spLocks noGrp="1"/>
           </p:cNvSpPr>
@@ -3356,7 +3794,13 @@
       </p:sp>
       <p:sp>
         <p:nvSpPr>
-          <p:cNvPr id="4" name="Slide Number Placeholder 3"/>
+          <p:cNvPr id="4" name="Slide Number Placeholder 3">
+            <a:extLst>
+              <a:ext uri="{FF2B5EF4-FFF2-40B4-BE49-F238E27FC236}">
+                <a16:creationId xmlns:a16="http://schemas.microsoft.com/office/drawing/2014/main" id="{8D2C62FF-19DB-10F0-B9B8-181AAADADEF4}"/>
+              </a:ext>
+            </a:extLst>
+          </p:cNvPr>
           <p:cNvSpPr>
             <a:spLocks noGrp="1"/>
           </p:cNvSpPr>
@@ -3370,7 +3814,7 @@
           <a:lstStyle/>
           <a:p>
             <a:fld id="{48F63A3B-78C7-47BE-AE5E-E10140E04643}" type="slidenum">
-              <a:rPr lang="en-US" dirty="0"/>
+              <a:rPr lang="en-US" smtClean="0"/>
               <a:t>‹#›</a:t>
             </a:fld>
             <a:endParaRPr lang="en-US" dirty="0"/>
@@ -3380,7 +3824,7 @@
     </p:spTree>
     <p:extLst>
       <p:ext uri="{BB962C8B-B14F-4D97-AF65-F5344CB8AC3E}">
-        <p14:creationId xmlns:p14="http://schemas.microsoft.com/office/powerpoint/2010/main" val="3425383260"/>
+        <p14:creationId xmlns:p14="http://schemas.microsoft.com/office/powerpoint/2010/main" val="332201793"/>
       </p:ext>
     </p:extLst>
   </p:cSld>
@@ -3410,7 +3854,13 @@
       </p:grpSpPr>
       <p:sp>
         <p:nvSpPr>
-          <p:cNvPr id="2" name="Title 1"/>
+          <p:cNvPr id="2" name="Title 1">
+            <a:extLst>
+              <a:ext uri="{FF2B5EF4-FFF2-40B4-BE49-F238E27FC236}">
+                <a16:creationId xmlns:a16="http://schemas.microsoft.com/office/drawing/2014/main" id="{543BF94D-3DFC-9727-8A70-0F1997ADECD0}"/>
+              </a:ext>
+            </a:extLst>
+          </p:cNvPr>
           <p:cNvSpPr>
             <a:spLocks noGrp="1"/>
           </p:cNvSpPr>
@@ -3436,13 +3886,19 @@
               <a:rPr lang="en-US"/>
               <a:t>Click to edit Master title style</a:t>
             </a:r>
-            <a:endParaRPr lang="en-US" dirty="0"/>
+            <a:endParaRPr lang="en-IN"/>
           </a:p>
         </p:txBody>
       </p:sp>
       <p:sp>
         <p:nvSpPr>
-          <p:cNvPr id="3" name="Content Placeholder 2"/>
+          <p:cNvPr id="3" name="Content Placeholder 2">
+            <a:extLst>
+              <a:ext uri="{FF2B5EF4-FFF2-40B4-BE49-F238E27FC236}">
+                <a16:creationId xmlns:a16="http://schemas.microsoft.com/office/drawing/2014/main" id="{5DBA8B21-929C-6C37-3E01-62A5FBD46D00}"/>
+              </a:ext>
+            </a:extLst>
+          </p:cNvPr>
           <p:cNvSpPr>
             <a:spLocks noGrp="1"/>
           </p:cNvSpPr>
@@ -3521,13 +3977,19 @@
               <a:rPr lang="en-US"/>
               <a:t>Fifth level</a:t>
             </a:r>
-            <a:endParaRPr lang="en-US" dirty="0"/>
+            <a:endParaRPr lang="en-IN"/>
           </a:p>
         </p:txBody>
       </p:sp>
       <p:sp>
         <p:nvSpPr>
-          <p:cNvPr id="4" name="Text Placeholder 3"/>
+          <p:cNvPr id="4" name="Text Placeholder 3">
+            <a:extLst>
+              <a:ext uri="{FF2B5EF4-FFF2-40B4-BE49-F238E27FC236}">
+                <a16:creationId xmlns:a16="http://schemas.microsoft.com/office/drawing/2014/main" id="{1CA7D3D3-20E7-6AFE-C6D2-361EBC3C5465}"/>
+              </a:ext>
+            </a:extLst>
+          </p:cNvPr>
           <p:cNvSpPr>
             <a:spLocks noGrp="1"/>
           </p:cNvSpPr>
@@ -3592,7 +4054,13 @@
       </p:sp>
       <p:sp>
         <p:nvSpPr>
-          <p:cNvPr id="5" name="Date Placeholder 4"/>
+          <p:cNvPr id="5" name="Date Placeholder 4">
+            <a:extLst>
+              <a:ext uri="{FF2B5EF4-FFF2-40B4-BE49-F238E27FC236}">
+                <a16:creationId xmlns:a16="http://schemas.microsoft.com/office/drawing/2014/main" id="{9BF145E6-0BDC-F1C3-FD4C-5A5FF576F0CD}"/>
+              </a:ext>
+            </a:extLst>
+          </p:cNvPr>
           <p:cNvSpPr>
             <a:spLocks noGrp="1"/>
           </p:cNvSpPr>
@@ -3606,8 +4074,8 @@
           <a:lstStyle/>
           <a:p>
             <a:fld id="{C764DE79-268F-4C1A-8933-263129D2AF90}" type="datetimeFigureOut">
-              <a:rPr lang="en-US" dirty="0"/>
-              <a:t>12/22/2025</a:t>
+              <a:rPr lang="en-US" smtClean="0"/>
+              <a:t>12/25/2025</a:t>
             </a:fld>
             <a:endParaRPr lang="en-US" dirty="0"/>
           </a:p>
@@ -3615,7 +4083,13 @@
       </p:sp>
       <p:sp>
         <p:nvSpPr>
-          <p:cNvPr id="6" name="Footer Placeholder 5"/>
+          <p:cNvPr id="6" name="Footer Placeholder 5">
+            <a:extLst>
+              <a:ext uri="{FF2B5EF4-FFF2-40B4-BE49-F238E27FC236}">
+                <a16:creationId xmlns:a16="http://schemas.microsoft.com/office/drawing/2014/main" id="{6E86ED23-2B48-AB80-4BE8-01CFDDDCE8F5}"/>
+              </a:ext>
+            </a:extLst>
+          </p:cNvPr>
           <p:cNvSpPr>
             <a:spLocks noGrp="1"/>
           </p:cNvSpPr>
@@ -3634,7 +4108,13 @@
       </p:sp>
       <p:sp>
         <p:nvSpPr>
-          <p:cNvPr id="7" name="Slide Number Placeholder 6"/>
+          <p:cNvPr id="7" name="Slide Number Placeholder 6">
+            <a:extLst>
+              <a:ext uri="{FF2B5EF4-FFF2-40B4-BE49-F238E27FC236}">
+                <a16:creationId xmlns:a16="http://schemas.microsoft.com/office/drawing/2014/main" id="{C2F75AEC-21FC-9A81-9396-1989DB78C29D}"/>
+              </a:ext>
+            </a:extLst>
+          </p:cNvPr>
           <p:cNvSpPr>
             <a:spLocks noGrp="1"/>
           </p:cNvSpPr>
@@ -3648,7 +4128,7 @@
           <a:lstStyle/>
           <a:p>
             <a:fld id="{48F63A3B-78C7-47BE-AE5E-E10140E04643}" type="slidenum">
-              <a:rPr lang="en-US" dirty="0"/>
+              <a:rPr lang="en-US" smtClean="0"/>
               <a:t>‹#›</a:t>
             </a:fld>
             <a:endParaRPr lang="en-US" dirty="0"/>
@@ -3658,7 +4138,7 @@
     </p:spTree>
     <p:extLst>
       <p:ext uri="{BB962C8B-B14F-4D97-AF65-F5344CB8AC3E}">
-        <p14:creationId xmlns:p14="http://schemas.microsoft.com/office/powerpoint/2010/main" val="3875688985"/>
+        <p14:creationId xmlns:p14="http://schemas.microsoft.com/office/powerpoint/2010/main" val="320400190"/>
       </p:ext>
     </p:extLst>
   </p:cSld>
@@ -3688,7 +4168,13 @@
       </p:grpSpPr>
       <p:sp>
         <p:nvSpPr>
-          <p:cNvPr id="2" name="Title 1"/>
+          <p:cNvPr id="2" name="Title 1">
+            <a:extLst>
+              <a:ext uri="{FF2B5EF4-FFF2-40B4-BE49-F238E27FC236}">
+                <a16:creationId xmlns:a16="http://schemas.microsoft.com/office/drawing/2014/main" id="{03A8DD86-0010-FB5E-2B3C-B26F83EFB2A8}"/>
+              </a:ext>
+            </a:extLst>
+          </p:cNvPr>
           <p:cNvSpPr>
             <a:spLocks noGrp="1"/>
           </p:cNvSpPr>
@@ -3714,15 +4200,21 @@
               <a:rPr lang="en-US"/>
               <a:t>Click to edit Master title style</a:t>
             </a:r>
-            <a:endParaRPr lang="en-US" dirty="0"/>
+            <a:endParaRPr lang="en-IN"/>
           </a:p>
         </p:txBody>
       </p:sp>
       <p:sp>
         <p:nvSpPr>
-          <p:cNvPr id="3" name="Picture Placeholder 2"/>
+          <p:cNvPr id="3" name="Picture Placeholder 2">
+            <a:extLst>
+              <a:ext uri="{FF2B5EF4-FFF2-40B4-BE49-F238E27FC236}">
+                <a16:creationId xmlns:a16="http://schemas.microsoft.com/office/drawing/2014/main" id="{0B8EC121-C3A3-7CE1-A0D7-A9301CACEB3D}"/>
+              </a:ext>
+            </a:extLst>
+          </p:cNvPr>
           <p:cNvSpPr>
-            <a:spLocks noGrp="1" noChangeAspect="1"/>
+            <a:spLocks noGrp="1"/>
           </p:cNvSpPr>
           <p:nvPr>
             <p:ph type="pic" idx="1"/>
@@ -3735,7 +4227,7 @@
           </a:xfrm>
         </p:spPr>
         <p:txBody>
-          <a:bodyPr anchor="t"/>
+          <a:bodyPr/>
           <a:lstStyle>
             <a:lvl1pPr marL="0" indent="0">
               <a:buNone/>
@@ -3775,17 +4267,19 @@
             </a:lvl9pPr>
           </a:lstStyle>
           <a:p>
-            <a:r>
-              <a:rPr lang="en-US"/>
-              <a:t>Click icon to add picture</a:t>
-            </a:r>
-            <a:endParaRPr lang="en-US" dirty="0"/>
+            <a:endParaRPr lang="en-IN"/>
           </a:p>
         </p:txBody>
       </p:sp>
       <p:sp>
         <p:nvSpPr>
-          <p:cNvPr id="4" name="Text Placeholder 3"/>
+          <p:cNvPr id="4" name="Text Placeholder 3">
+            <a:extLst>
+              <a:ext uri="{FF2B5EF4-FFF2-40B4-BE49-F238E27FC236}">
+                <a16:creationId xmlns:a16="http://schemas.microsoft.com/office/drawing/2014/main" id="{693D9FD0-CD30-47E9-8DD6-0235E2B7903C}"/>
+              </a:ext>
+            </a:extLst>
+          </p:cNvPr>
           <p:cNvSpPr>
             <a:spLocks noGrp="1"/>
           </p:cNvSpPr>
@@ -3850,7 +4344,13 @@
       </p:sp>
       <p:sp>
         <p:nvSpPr>
-          <p:cNvPr id="5" name="Date Placeholder 4"/>
+          <p:cNvPr id="5" name="Date Placeholder 4">
+            <a:extLst>
+              <a:ext uri="{FF2B5EF4-FFF2-40B4-BE49-F238E27FC236}">
+                <a16:creationId xmlns:a16="http://schemas.microsoft.com/office/drawing/2014/main" id="{BB6BF997-8E9D-95A0-8434-578D6E1AF98E}"/>
+              </a:ext>
+            </a:extLst>
+          </p:cNvPr>
           <p:cNvSpPr>
             <a:spLocks noGrp="1"/>
           </p:cNvSpPr>
@@ -3864,8 +4364,8 @@
           <a:lstStyle/>
           <a:p>
             <a:fld id="{C764DE79-268F-4C1A-8933-263129D2AF90}" type="datetimeFigureOut">
-              <a:rPr lang="en-US" dirty="0"/>
-              <a:t>12/22/2025</a:t>
+              <a:rPr lang="en-US" smtClean="0"/>
+              <a:t>12/25/2025</a:t>
             </a:fld>
             <a:endParaRPr lang="en-US" dirty="0"/>
           </a:p>
@@ -3873,7 +4373,13 @@
       </p:sp>
       <p:sp>
         <p:nvSpPr>
-          <p:cNvPr id="6" name="Footer Placeholder 5"/>
+          <p:cNvPr id="6" name="Footer Placeholder 5">
+            <a:extLst>
+              <a:ext uri="{FF2B5EF4-FFF2-40B4-BE49-F238E27FC236}">
+                <a16:creationId xmlns:a16="http://schemas.microsoft.com/office/drawing/2014/main" id="{D1A1A760-29B5-E72A-47EA-E55361F8FC1F}"/>
+              </a:ext>
+            </a:extLst>
+          </p:cNvPr>
           <p:cNvSpPr>
             <a:spLocks noGrp="1"/>
           </p:cNvSpPr>
@@ -3892,7 +4398,13 @@
       </p:sp>
       <p:sp>
         <p:nvSpPr>
-          <p:cNvPr id="7" name="Slide Number Placeholder 6"/>
+          <p:cNvPr id="7" name="Slide Number Placeholder 6">
+            <a:extLst>
+              <a:ext uri="{FF2B5EF4-FFF2-40B4-BE49-F238E27FC236}">
+                <a16:creationId xmlns:a16="http://schemas.microsoft.com/office/drawing/2014/main" id="{018BD88F-F00F-605D-B5BB-A510DC2DF972}"/>
+              </a:ext>
+            </a:extLst>
+          </p:cNvPr>
           <p:cNvSpPr>
             <a:spLocks noGrp="1"/>
           </p:cNvSpPr>
@@ -3906,7 +4418,7 @@
           <a:lstStyle/>
           <a:p>
             <a:fld id="{48F63A3B-78C7-47BE-AE5E-E10140E04643}" type="slidenum">
-              <a:rPr lang="en-US" dirty="0"/>
+              <a:rPr lang="en-US" smtClean="0"/>
               <a:t>‹#›</a:t>
             </a:fld>
             <a:endParaRPr lang="en-US" dirty="0"/>
@@ -3916,7 +4428,7 @@
     </p:spTree>
     <p:extLst>
       <p:ext uri="{BB962C8B-B14F-4D97-AF65-F5344CB8AC3E}">
-        <p14:creationId xmlns:p14="http://schemas.microsoft.com/office/powerpoint/2010/main" val="2044332431"/>
+        <p14:creationId xmlns:p14="http://schemas.microsoft.com/office/powerpoint/2010/main" val="3473619547"/>
       </p:ext>
     </p:extLst>
   </p:cSld>
@@ -3951,7 +4463,13 @@
       </p:grpSpPr>
       <p:sp>
         <p:nvSpPr>
-          <p:cNvPr id="2" name="Title Placeholder 1"/>
+          <p:cNvPr id="2" name="Title Placeholder 1">
+            <a:extLst>
+              <a:ext uri="{FF2B5EF4-FFF2-40B4-BE49-F238E27FC236}">
+                <a16:creationId xmlns:a16="http://schemas.microsoft.com/office/drawing/2014/main" id="{9A9C3761-8EAF-7E49-371A-C963C386E8C0}"/>
+              </a:ext>
+            </a:extLst>
+          </p:cNvPr>
           <p:cNvSpPr>
             <a:spLocks noGrp="1"/>
           </p:cNvSpPr>
@@ -3978,13 +4496,19 @@
               <a:rPr lang="en-US"/>
               <a:t>Click to edit Master title style</a:t>
             </a:r>
-            <a:endParaRPr lang="en-US" dirty="0"/>
+            <a:endParaRPr lang="en-IN"/>
           </a:p>
         </p:txBody>
       </p:sp>
       <p:sp>
         <p:nvSpPr>
-          <p:cNvPr id="3" name="Text Placeholder 2"/>
+          <p:cNvPr id="3" name="Text Placeholder 2">
+            <a:extLst>
+              <a:ext uri="{FF2B5EF4-FFF2-40B4-BE49-F238E27FC236}">
+                <a16:creationId xmlns:a16="http://schemas.microsoft.com/office/drawing/2014/main" id="{86C5AC65-5AC4-1596-4384-35CBE354F32B}"/>
+              </a:ext>
+            </a:extLst>
+          </p:cNvPr>
           <p:cNvSpPr>
             <a:spLocks noGrp="1"/>
           </p:cNvSpPr>
@@ -4040,13 +4564,19 @@
               <a:rPr lang="en-US"/>
               <a:t>Fifth level</a:t>
             </a:r>
-            <a:endParaRPr lang="en-US" dirty="0"/>
+            <a:endParaRPr lang="en-IN"/>
           </a:p>
         </p:txBody>
       </p:sp>
       <p:sp>
         <p:nvSpPr>
-          <p:cNvPr id="4" name="Date Placeholder 3"/>
+          <p:cNvPr id="4" name="Date Placeholder 3">
+            <a:extLst>
+              <a:ext uri="{FF2B5EF4-FFF2-40B4-BE49-F238E27FC236}">
+                <a16:creationId xmlns:a16="http://schemas.microsoft.com/office/drawing/2014/main" id="{B9760C95-C80F-4B96-DD7A-84F0A6E00B68}"/>
+              </a:ext>
+            </a:extLst>
+          </p:cNvPr>
           <p:cNvSpPr>
             <a:spLocks noGrp="1"/>
           </p:cNvSpPr>
@@ -4070,7 +4600,7 @@
               <a:defRPr sz="900">
                 <a:solidFill>
                   <a:schemeClr val="tx1">
-                    <a:tint val="75000"/>
+                    <a:tint val="82000"/>
                   </a:schemeClr>
                 </a:solidFill>
               </a:defRPr>
@@ -4078,8 +4608,8 @@
           </a:lstStyle>
           <a:p>
             <a:fld id="{C764DE79-268F-4C1A-8933-263129D2AF90}" type="datetimeFigureOut">
-              <a:rPr lang="en-US" dirty="0"/>
-              <a:t>12/22/2025</a:t>
+              <a:rPr lang="en-US" smtClean="0"/>
+              <a:t>12/25/2025</a:t>
             </a:fld>
             <a:endParaRPr lang="en-US" dirty="0"/>
           </a:p>
@@ -4087,7 +4617,13 @@
       </p:sp>
       <p:sp>
         <p:nvSpPr>
-          <p:cNvPr id="5" name="Footer Placeholder 4"/>
+          <p:cNvPr id="5" name="Footer Placeholder 4">
+            <a:extLst>
+              <a:ext uri="{FF2B5EF4-FFF2-40B4-BE49-F238E27FC236}">
+                <a16:creationId xmlns:a16="http://schemas.microsoft.com/office/drawing/2014/main" id="{F5B81FF3-5AE3-034B-7569-297EC7C7207C}"/>
+              </a:ext>
+            </a:extLst>
+          </p:cNvPr>
           <p:cNvSpPr>
             <a:spLocks noGrp="1"/>
           </p:cNvSpPr>
@@ -4111,7 +4647,7 @@
               <a:defRPr sz="900">
                 <a:solidFill>
                   <a:schemeClr val="tx1">
-                    <a:tint val="75000"/>
+                    <a:tint val="82000"/>
                   </a:schemeClr>
                 </a:solidFill>
               </a:defRPr>
@@ -4124,7 +4660,13 @@
       </p:sp>
       <p:sp>
         <p:nvSpPr>
-          <p:cNvPr id="6" name="Slide Number Placeholder 5"/>
+          <p:cNvPr id="6" name="Slide Number Placeholder 5">
+            <a:extLst>
+              <a:ext uri="{FF2B5EF4-FFF2-40B4-BE49-F238E27FC236}">
+                <a16:creationId xmlns:a16="http://schemas.microsoft.com/office/drawing/2014/main" id="{7E715D95-56C2-B885-7DBA-65E26F70408D}"/>
+              </a:ext>
+            </a:extLst>
+          </p:cNvPr>
           <p:cNvSpPr>
             <a:spLocks noGrp="1"/>
           </p:cNvSpPr>
@@ -4148,7 +4690,7 @@
               <a:defRPr sz="900">
                 <a:solidFill>
                   <a:schemeClr val="tx1">
-                    <a:tint val="75000"/>
+                    <a:tint val="82000"/>
                   </a:schemeClr>
                 </a:solidFill>
               </a:defRPr>
@@ -4156,7 +4698,7 @@
           </a:lstStyle>
           <a:p>
             <a:fld id="{48F63A3B-78C7-47BE-AE5E-E10140E04643}" type="slidenum">
-              <a:rPr lang="en-US" dirty="0"/>
+              <a:rPr lang="en-US" smtClean="0"/>
               <a:t>‹#›</a:t>
             </a:fld>
             <a:endParaRPr lang="en-US" dirty="0"/>
@@ -4166,24 +4708,24 @@
     </p:spTree>
     <p:extLst>
       <p:ext uri="{BB962C8B-B14F-4D97-AF65-F5344CB8AC3E}">
-        <p14:creationId xmlns:p14="http://schemas.microsoft.com/office/powerpoint/2010/main" val="1965384486"/>
+        <p14:creationId xmlns:p14="http://schemas.microsoft.com/office/powerpoint/2010/main" val="3015565406"/>
       </p:ext>
     </p:extLst>
   </p:cSld>
-  <p:clrMap bg1="dk1" tx1="lt1" bg2="dk2" tx2="lt2" accent1="accent1" accent2="accent2" accent3="accent3" accent4="accent4" accent5="accent5" accent6="accent6" hlink="hlink" folHlink="folHlink"/>
+  <p:clrMap bg1="lt1" tx1="dk1" bg2="lt2" tx2="dk2" accent1="accent1" accent2="accent2" accent3="accent3" accent4="accent4" accent5="accent5" accent6="accent6" hlink="hlink" folHlink="folHlink"/>
   <p:sldLayoutIdLst>
-    <p:sldLayoutId id="2147483651" r:id="rId1"/>
-    <p:sldLayoutId id="2147483652" r:id="rId2"/>
-    <p:sldLayoutId id="2147483653" r:id="rId3"/>
-    <p:sldLayoutId id="2147483654" r:id="rId4"/>
-    <p:sldLayoutId id="2147483655" r:id="rId5"/>
-    <p:sldLayoutId id="2147483656" r:id="rId6"/>
-    <p:sldLayoutId id="2147483657" r:id="rId7"/>
-    <p:sldLayoutId id="2147483658" r:id="rId8"/>
-    <p:sldLayoutId id="2147483659" r:id="rId9"/>
-    <p:sldLayoutId id="2147483660" r:id="rId10"/>
-    <p:sldLayoutId id="2147483661" r:id="rId11"/>
-    <p:sldLayoutId id="2147483662" r:id="rId12"/>
+    <p:sldLayoutId id="2147483664" r:id="rId1"/>
+    <p:sldLayoutId id="2147483665" r:id="rId2"/>
+    <p:sldLayoutId id="2147483666" r:id="rId3"/>
+    <p:sldLayoutId id="2147483667" r:id="rId4"/>
+    <p:sldLayoutId id="2147483668" r:id="rId5"/>
+    <p:sldLayoutId id="2147483669" r:id="rId6"/>
+    <p:sldLayoutId id="2147483670" r:id="rId7"/>
+    <p:sldLayoutId id="2147483671" r:id="rId8"/>
+    <p:sldLayoutId id="2147483672" r:id="rId9"/>
+    <p:sldLayoutId id="2147483673" r:id="rId10"/>
+    <p:sldLayoutId id="2147483674" r:id="rId11"/>
+    <p:sldLayoutId id="2147483675" r:id="rId12"/>
   </p:sldLayoutIdLst>
   <p:hf sldNum="0" hdr="0" ftr="0" dt="0"/>
   <p:txStyles>
@@ -4625,6 +5167,18 @@
   <p:clrMapOvr>
     <a:masterClrMapping/>
   </p:clrMapOvr>
+  <mc:AlternateContent xmlns:mc="http://schemas.openxmlformats.org/markup-compatibility/2006">
+    <mc:Choice xmlns:p14="http://schemas.microsoft.com/office/powerpoint/2010/main" Requires="p14">
+      <p:transition spd="slow" p14:dur="3400">
+        <p14:reveal/>
+      </p:transition>
+    </mc:Choice>
+    <mc:Fallback>
+      <p:transition spd="slow">
+        <p:fade/>
+      </p:transition>
+    </mc:Fallback>
+  </mc:AlternateContent>
 </p:sld>
 </file>
 
@@ -5439,6 +5993,18 @@
   <p:clrMapOvr>
     <a:masterClrMapping/>
   </p:clrMapOvr>
+  <mc:AlternateContent xmlns:mc="http://schemas.openxmlformats.org/markup-compatibility/2006">
+    <mc:Choice xmlns:p159="http://schemas.microsoft.com/office/powerpoint/2015/09/main" Requires="p159">
+      <p:transition xmlns:p14="http://schemas.microsoft.com/office/powerpoint/2010/main" spd="slow" p14:dur="2000">
+        <p159:morph option="byObject"/>
+      </p:transition>
+    </mc:Choice>
+    <mc:Fallback>
+      <p:transition spd="slow">
+        <p:fade/>
+      </p:transition>
+    </mc:Fallback>
+  </mc:AlternateContent>
 </p:sld>
 </file>
 
@@ -5507,6 +6073,18 @@
   <p:clrMapOvr>
     <a:masterClrMapping/>
   </p:clrMapOvr>
+  <mc:AlternateContent xmlns:mc="http://schemas.openxmlformats.org/markup-compatibility/2006">
+    <mc:Choice xmlns:p15="http://schemas.microsoft.com/office/powerpoint/2012/main" Requires="p15">
+      <p:transition xmlns:p14="http://schemas.microsoft.com/office/powerpoint/2010/main" spd="slow" p14:dur="2000">
+        <p15:prstTrans prst="drape"/>
+      </p:transition>
+    </mc:Choice>
+    <mc:Fallback>
+      <p:transition spd="slow">
+        <p:fade/>
+      </p:transition>
+    </mc:Fallback>
+  </mc:AlternateContent>
 </p:sld>
 </file>
 
@@ -5732,6 +6310,9 @@
   <p:clrMapOvr>
     <a:masterClrMapping/>
   </p:clrMapOvr>
+  <p:transition spd="slow">
+    <p:cover/>
+  </p:transition>
 </p:sld>
 </file>
 
@@ -5800,6 +6381,18 @@
   <p:clrMapOvr>
     <a:masterClrMapping/>
   </p:clrMapOvr>
+  <mc:AlternateContent xmlns:mc="http://schemas.openxmlformats.org/markup-compatibility/2006">
+    <mc:Choice xmlns:p15="http://schemas.microsoft.com/office/powerpoint/2012/main" Requires="p15">
+      <p:transition xmlns:p14="http://schemas.microsoft.com/office/powerpoint/2010/main" spd="slow" p14:dur="1250">
+        <p15:prstTrans prst="peelOff"/>
+      </p:transition>
+    </mc:Choice>
+    <mc:Fallback>
+      <p:transition spd="slow">
+        <p:fade/>
+      </p:transition>
+    </mc:Fallback>
+  </mc:AlternateContent>
 </p:sld>
 </file>
 
@@ -6824,6 +7417,9 @@
   <p:clrMapOvr>
     <a:masterClrMapping/>
   </p:clrMapOvr>
+  <p:transition spd="slow">
+    <p:cover/>
+  </p:transition>
 </p:sld>
 </file>
 
@@ -6892,6 +7488,18 @@
   <p:clrMapOvr>
     <a:masterClrMapping/>
   </p:clrMapOvr>
+  <mc:AlternateContent xmlns:mc="http://schemas.openxmlformats.org/markup-compatibility/2006">
+    <mc:Choice xmlns:p15="http://schemas.microsoft.com/office/powerpoint/2012/main" Requires="p15">
+      <p:transition xmlns:p14="http://schemas.microsoft.com/office/powerpoint/2010/main" spd="slow" p14:dur="1250">
+        <p15:prstTrans prst="peelOff"/>
+      </p:transition>
+    </mc:Choice>
+    <mc:Fallback>
+      <p:transition spd="slow">
+        <p:fade/>
+      </p:transition>
+    </mc:Fallback>
+  </mc:AlternateContent>
 </p:sld>
 </file>
 
@@ -6952,6 +7560,18 @@
   <p:clrMapOvr>
     <a:masterClrMapping/>
   </p:clrMapOvr>
+  <mc:AlternateContent xmlns:mc="http://schemas.openxmlformats.org/markup-compatibility/2006">
+    <mc:Choice xmlns:p14="http://schemas.microsoft.com/office/powerpoint/2010/main" Requires="p14">
+      <p:transition spd="slow" p14:dur="800">
+        <p:circle/>
+      </p:transition>
+    </mc:Choice>
+    <mc:Fallback>
+      <p:transition spd="slow">
+        <p:circle/>
+      </p:transition>
+    </mc:Fallback>
+  </mc:AlternateContent>
 </p:sld>
 </file>
 
@@ -7020,6 +7640,18 @@
   <p:clrMapOvr>
     <a:masterClrMapping/>
   </p:clrMapOvr>
+  <mc:AlternateContent xmlns:mc="http://schemas.openxmlformats.org/markup-compatibility/2006">
+    <mc:Choice xmlns:p15="http://schemas.microsoft.com/office/powerpoint/2012/main" Requires="p15">
+      <p:transition xmlns:p14="http://schemas.microsoft.com/office/powerpoint/2010/main" spd="slow" p14:dur="2000">
+        <p15:prstTrans prst="drape"/>
+      </p:transition>
+    </mc:Choice>
+    <mc:Fallback>
+      <p:transition spd="slow">
+        <p:fade/>
+      </p:transition>
+    </mc:Fallback>
+  </mc:AlternateContent>
 </p:sld>
 </file>
 
@@ -7947,6 +8579,9 @@
   <p:clrMapOvr>
     <a:masterClrMapping/>
   </p:clrMapOvr>
+  <p:transition spd="slow">
+    <p:cover/>
+  </p:transition>
 </p:sld>
 </file>
 
@@ -8172,6 +8807,9 @@
   <p:clrMapOvr>
     <a:masterClrMapping/>
   </p:clrMapOvr>
+  <p:transition spd="slow">
+    <p:cover/>
+  </p:transition>
 </p:sld>
 </file>
 
@@ -8376,6 +9014,18 @@
   <p:clrMapOvr>
     <a:masterClrMapping/>
   </p:clrMapOvr>
+  <mc:AlternateContent xmlns:mc="http://schemas.openxmlformats.org/markup-compatibility/2006">
+    <mc:Choice xmlns:p15="http://schemas.microsoft.com/office/powerpoint/2012/main" Requires="p15">
+      <p:transition xmlns:p14="http://schemas.microsoft.com/office/powerpoint/2010/main" spd="slow" p14:dur="6000">
+        <p15:prstTrans prst="curtains"/>
+      </p:transition>
+    </mc:Choice>
+    <mc:Fallback>
+      <p:transition spd="slow">
+        <p:fade/>
+      </p:transition>
+    </mc:Fallback>
+  </mc:AlternateContent>
 </p:sld>
 </file>
 
@@ -8601,6 +9251,9 @@
   <p:clrMapOvr>
     <a:masterClrMapping/>
   </p:clrMapOvr>
+  <p:transition spd="slow">
+    <p:cover/>
+  </p:transition>
 </p:sld>
 </file>
 
@@ -8822,6 +9475,18 @@
   <p:clrMapOvr>
     <a:masterClrMapping/>
   </p:clrMapOvr>
+  <mc:AlternateContent xmlns:mc="http://schemas.openxmlformats.org/markup-compatibility/2006">
+    <mc:Choice xmlns:p14="http://schemas.microsoft.com/office/powerpoint/2010/main" Requires="p14">
+      <p:transition spd="slow" p14:dur="1300">
+        <p14:pan dir="u"/>
+      </p:transition>
+    </mc:Choice>
+    <mc:Fallback>
+      <p:transition spd="slow">
+        <p:fade/>
+      </p:transition>
+    </mc:Fallback>
+  </mc:AlternateContent>
 </p:sld>
 </file>
 
@@ -8981,6 +9646,18 @@
   <p:clrMapOvr>
     <a:masterClrMapping/>
   </p:clrMapOvr>
+  <mc:AlternateContent xmlns:mc="http://schemas.openxmlformats.org/markup-compatibility/2006">
+    <mc:Choice xmlns:p14="http://schemas.microsoft.com/office/powerpoint/2010/main" Requires="p14">
+      <p:transition spd="slow" p14:dur="3400">
+        <p14:reveal/>
+      </p:transition>
+    </mc:Choice>
+    <mc:Fallback>
+      <p:transition spd="slow">
+        <p:fade/>
+      </p:transition>
+    </mc:Fallback>
+  </mc:AlternateContent>
 </p:sld>
 </file>
 
@@ -9198,6 +9875,9 @@
   <p:clrMapOvr>
     <a:masterClrMapping/>
   </p:clrMapOvr>
+  <p:transition spd="slow">
+    <p:cover/>
+  </p:transition>
 </p:sld>
 </file>
 
@@ -9433,6 +10113,9 @@
   <p:clrMapOvr>
     <a:masterClrMapping/>
   </p:clrMapOvr>
+  <p:transition spd="slow">
+    <p:cover/>
+  </p:transition>
 </p:sld>
 </file>
 
@@ -9501,6 +10184,18 @@
   <p:clrMapOvr>
     <a:masterClrMapping/>
   </p:clrMapOvr>
+  <mc:AlternateContent xmlns:mc="http://schemas.openxmlformats.org/markup-compatibility/2006">
+    <mc:Choice xmlns:p15="http://schemas.microsoft.com/office/powerpoint/2012/main" Requires="p15">
+      <p:transition xmlns:p14="http://schemas.microsoft.com/office/powerpoint/2010/main" spd="slow" p14:dur="2000">
+        <p15:prstTrans prst="prestige"/>
+      </p:transition>
+    </mc:Choice>
+    <mc:Fallback>
+      <p:transition spd="slow">
+        <p:fade/>
+      </p:transition>
+    </mc:Fallback>
+  </mc:AlternateContent>
 </p:sld>
 </file>
 
@@ -10165,6 +10860,9 @@
   <p:clrMapOvr>
     <a:masterClrMapping/>
   </p:clrMapOvr>
+  <p:transition spd="med">
+    <p:pull/>
+  </p:transition>
 </p:sld>
 </file>
 
@@ -10239,6 +10937,18 @@
   <p:clrMapOvr>
     <a:masterClrMapping/>
   </p:clrMapOvr>
+  <mc:AlternateContent xmlns:mc="http://schemas.openxmlformats.org/markup-compatibility/2006">
+    <mc:Choice xmlns:p14="http://schemas.microsoft.com/office/powerpoint/2010/main" Requires="p14">
+      <p:transition spd="slow" p14:dur="1250">
+        <p14:switch dir="r"/>
+      </p:transition>
+    </mc:Choice>
+    <mc:Fallback>
+      <p:transition spd="slow">
+        <p:fade/>
+      </p:transition>
+    </mc:Fallback>
+  </mc:AlternateContent>
 </p:sld>
 </file>
 
@@ -11358,6 +12068,9 @@
   <p:clrMapOvr>
     <a:masterClrMapping/>
   </p:clrMapOvr>
+  <p:transition spd="med">
+    <p:pull/>
+  </p:transition>
 </p:sld>
 </file>
 
@@ -11426,13 +12139,16 @@
   <p:clrMapOvr>
     <a:masterClrMapping/>
   </p:clrMapOvr>
+  <p:transition spd="slow">
+    <p:cover/>
+  </p:transition>
 </p:sld>
 </file>
 
 <file path=ppt/theme/theme1.xml><?xml version="1.0" encoding="utf-8"?>
-<a:theme xmlns:a="http://schemas.openxmlformats.org/drawingml/2006/main" name="Office 2013 - 2022 Theme">
+<a:theme xmlns:a="http://schemas.openxmlformats.org/drawingml/2006/main" name="Office Theme">
   <a:themeElements>
-    <a:clrScheme name="Office 2013 - 2022 Theme">
+    <a:clrScheme name="Office">
       <a:dk1>
         <a:sysClr val="windowText" lastClr="000000"/>
       </a:dk1>
@@ -11440,39 +12156,39 @@
         <a:sysClr val="window" lastClr="FFFFFF"/>
       </a:lt1>
       <a:dk2>
-        <a:srgbClr val="44546A"/>
+        <a:srgbClr val="0E2841"/>
       </a:dk2>
       <a:lt2>
-        <a:srgbClr val="E7E6E6"/>
+        <a:srgbClr val="E8E8E8"/>
       </a:lt2>
       <a:accent1>
-        <a:srgbClr val="4472C4"/>
+        <a:srgbClr val="156082"/>
       </a:accent1>
       <a:accent2>
-        <a:srgbClr val="ED7D31"/>
+        <a:srgbClr val="E97132"/>
       </a:accent2>
       <a:accent3>
-        <a:srgbClr val="A5A5A5"/>
+        <a:srgbClr val="196B24"/>
       </a:accent3>
       <a:accent4>
-        <a:srgbClr val="FFC000"/>
+        <a:srgbClr val="0F9ED5"/>
       </a:accent4>
       <a:accent5>
-        <a:srgbClr val="5B9BD5"/>
+        <a:srgbClr val="A02B93"/>
       </a:accent5>
       <a:accent6>
-        <a:srgbClr val="70AD47"/>
+        <a:srgbClr val="4EA72E"/>
       </a:accent6>
       <a:hlink>
-        <a:srgbClr val="0563C1"/>
+        <a:srgbClr val="467886"/>
       </a:hlink>
       <a:folHlink>
-        <a:srgbClr val="954F72"/>
+        <a:srgbClr val="96607D"/>
       </a:folHlink>
     </a:clrScheme>
-    <a:fontScheme name="Office 2013 - 2022 Theme">
+    <a:fontScheme name="Office">
       <a:majorFont>
-        <a:latin typeface="Calibri Light" panose="020F0302020204030204"/>
+        <a:latin typeface="Aptos Display" panose="02110004020202020204"/>
         <a:ea typeface=""/>
         <a:cs typeface=""/>
         <a:font script="Jpan" typeface="游ゴシック Light"/>
@@ -11505,9 +12221,26 @@
         <a:font script="Viet" typeface="Times New Roman"/>
         <a:font script="Uigh" typeface="Microsoft Uighur"/>
         <a:font script="Geor" typeface="Sylfaen"/>
+        <a:font script="Armn" typeface="Arial"/>
+        <a:font script="Bugi" typeface="Leelawadee UI"/>
+        <a:font script="Bopo" typeface="Microsoft JhengHei"/>
+        <a:font script="Java" typeface="Javanese Text"/>
+        <a:font script="Lisu" typeface="Segoe UI"/>
+        <a:font script="Mymr" typeface="Myanmar Text"/>
+        <a:font script="Nkoo" typeface="Ebrima"/>
+        <a:font script="Olck" typeface="Nirmala UI"/>
+        <a:font script="Osma" typeface="Ebrima"/>
+        <a:font script="Phag" typeface="Phagspa"/>
+        <a:font script="Syrn" typeface="Estrangelo Edessa"/>
+        <a:font script="Syrj" typeface="Estrangelo Edessa"/>
+        <a:font script="Syre" typeface="Estrangelo Edessa"/>
+        <a:font script="Sora" typeface="Nirmala UI"/>
+        <a:font script="Tale" typeface="Microsoft Tai Le"/>
+        <a:font script="Talu" typeface="Microsoft New Tai Lue"/>
+        <a:font script="Tfng" typeface="Ebrima"/>
       </a:majorFont>
       <a:minorFont>
-        <a:latin typeface="Calibri" panose="020F0502020204030204"/>
+        <a:latin typeface="Aptos" panose="02110004020202020204"/>
         <a:ea typeface=""/>
         <a:cs typeface=""/>
         <a:font script="Jpan" typeface="游ゴシック"/>
@@ -11540,9 +12273,26 @@
         <a:font script="Viet" typeface="Arial"/>
         <a:font script="Uigh" typeface="Microsoft Uighur"/>
         <a:font script="Geor" typeface="Sylfaen"/>
+        <a:font script="Armn" typeface="Arial"/>
+        <a:font script="Bugi" typeface="Leelawadee UI"/>
+        <a:font script="Bopo" typeface="Microsoft JhengHei"/>
+        <a:font script="Java" typeface="Javanese Text"/>
+        <a:font script="Lisu" typeface="Segoe UI"/>
+        <a:font script="Mymr" typeface="Myanmar Text"/>
+        <a:font script="Nkoo" typeface="Ebrima"/>
+        <a:font script="Olck" typeface="Nirmala UI"/>
+        <a:font script="Osma" typeface="Ebrima"/>
+        <a:font script="Phag" typeface="Phagspa"/>
+        <a:font script="Syrn" typeface="Estrangelo Edessa"/>
+        <a:font script="Syrj" typeface="Estrangelo Edessa"/>
+        <a:font script="Syre" typeface="Estrangelo Edessa"/>
+        <a:font script="Sora" typeface="Nirmala UI"/>
+        <a:font script="Tale" typeface="Microsoft Tai Le"/>
+        <a:font script="Talu" typeface="Microsoft New Tai Lue"/>
+        <a:font script="Tfng" typeface="Ebrima"/>
       </a:minorFont>
     </a:fontScheme>
-    <a:fmtScheme name="Office 2013 - 2022 Theme">
+    <a:fmtScheme name="Office">
       <a:fillStyleLst>
         <a:solidFill>
           <a:schemeClr val="phClr"/>
@@ -11601,13 +12351,6 @@
         </a:gradFill>
       </a:fillStyleLst>
       <a:lnStyleLst>
-        <a:ln w="6350" cap="flat" cmpd="sng" algn="ctr">
-          <a:solidFill>
-            <a:schemeClr val="phClr"/>
-          </a:solidFill>
-          <a:prstDash val="solid"/>
-          <a:miter lim="800000"/>
-        </a:ln>
         <a:ln w="12700" cap="flat" cmpd="sng" algn="ctr">
           <a:solidFill>
             <a:schemeClr val="phClr"/>
@@ -11616,6 +12359,13 @@
           <a:miter lim="800000"/>
         </a:ln>
         <a:ln w="19050" cap="flat" cmpd="sng" algn="ctr">
+          <a:solidFill>
+            <a:schemeClr val="phClr"/>
+          </a:solidFill>
+          <a:prstDash val="solid"/>
+          <a:miter lim="800000"/>
+        </a:ln>
+        <a:ln w="25400" cap="flat" cmpd="sng" algn="ctr">
           <a:solidFill>
             <a:schemeClr val="phClr"/>
           </a:solidFill>
@@ -11680,11 +12430,31 @@
       </a:bgFillStyleLst>
     </a:fmtScheme>
   </a:themeElements>
-  <a:objectDefaults/>
+  <a:objectDefaults>
+    <a:lnDef>
+      <a:spPr/>
+      <a:bodyPr/>
+      <a:lstStyle/>
+      <a:style>
+        <a:lnRef idx="2">
+          <a:schemeClr val="accent1"/>
+        </a:lnRef>
+        <a:fillRef idx="0">
+          <a:schemeClr val="accent1"/>
+        </a:fillRef>
+        <a:effectRef idx="1">
+          <a:schemeClr val="accent1"/>
+        </a:effectRef>
+        <a:fontRef idx="minor">
+          <a:schemeClr val="tx1"/>
+        </a:fontRef>
+      </a:style>
+    </a:lnDef>
+  </a:objectDefaults>
   <a:extraClrSchemeLst/>
   <a:extLst>
     <a:ext uri="{05A4C25C-085E-4340-85A3-A5531E510DB2}">
-      <thm15:themeFamily xmlns:thm15="http://schemas.microsoft.com/office/thememl/2012/main" name="Office 2013 - 2022 Theme" id="{62F939B6-93AF-4DB8-9C6B-D6C7DFDC589F}" vid="{4F46216B-77A9-411A-B9D3-5023FCB70208}"/>
+      <thm15:themeFamily xmlns:thm15="http://schemas.microsoft.com/office/thememl/2012/main" name="Office Theme" id="{2E142A2C-CD16-42D6-873A-C26D2A0506FA}" vid="{1BDDFF52-6CD6-40A5-AB3C-68EB2F1E4D0A}"/>
     </a:ext>
   </a:extLst>
 </a:theme>

</xml_diff>